<commit_message>
Updated the content of the Presentation slides
</commit_message>
<xml_diff>
--- a/Capstone_Project_2_ppt.pptx
+++ b/Capstone_Project_2_ppt.pptx
@@ -317,7 +317,7 @@
           <a:p>
             <a:fld id="{9184DA70-C731-4C70-880D-CCD4705E623C}" type="datetime1">
               <a:rPr lang="en-US" smtClean="0"/>
-              <a:t>5/29/2020</a:t>
+              <a:t>5/30/2020</a:t>
             </a:fld>
             <a:endParaRPr lang="en-US" dirty="0"/>
           </a:p>
@@ -655,7 +655,7 @@
           <a:p>
             <a:fld id="{62D6E202-B606-4609-B914-27C9371A1F6D}" type="datetime1">
               <a:rPr lang="en-US" smtClean="0"/>
-              <a:t>5/29/2020</a:t>
+              <a:t>5/30/2020</a:t>
             </a:fld>
             <a:endParaRPr lang="en-US" dirty="0"/>
           </a:p>
@@ -1057,7 +1057,7 @@
           <a:p>
             <a:fld id="{62D6E202-B606-4609-B914-27C9371A1F6D}" type="datetime1">
               <a:rPr lang="en-US" smtClean="0"/>
-              <a:t>5/29/2020</a:t>
+              <a:t>5/30/2020</a:t>
             </a:fld>
             <a:endParaRPr lang="en-US" dirty="0"/>
           </a:p>
@@ -1394,7 +1394,7 @@
           <a:p>
             <a:fld id="{62D6E202-B606-4609-B914-27C9371A1F6D}" type="datetime1">
               <a:rPr lang="en-US" smtClean="0"/>
-              <a:t>5/29/2020</a:t>
+              <a:t>5/30/2020</a:t>
             </a:fld>
             <a:endParaRPr lang="en-US" dirty="0"/>
           </a:p>
@@ -1715,7 +1715,7 @@
           <a:p>
             <a:fld id="{62D6E202-B606-4609-B914-27C9371A1F6D}" type="datetime1">
               <a:rPr lang="en-US" smtClean="0"/>
-              <a:t>5/29/2020</a:t>
+              <a:t>5/30/2020</a:t>
             </a:fld>
             <a:endParaRPr lang="en-US" dirty="0"/>
           </a:p>
@@ -2112,7 +2112,7 @@
           <a:p>
             <a:fld id="{62D6E202-B606-4609-B914-27C9371A1F6D}" type="datetime1">
               <a:rPr lang="en-US" smtClean="0"/>
-              <a:t>5/29/2020</a:t>
+              <a:t>5/30/2020</a:t>
             </a:fld>
             <a:endParaRPr lang="en-US" dirty="0"/>
           </a:p>
@@ -2370,7 +2370,7 @@
           <a:p>
             <a:fld id="{B612A279-0833-481D-8C56-F67FD0AC6C50}" type="datetime1">
               <a:rPr lang="en-US" smtClean="0"/>
-              <a:t>5/29/2020</a:t>
+              <a:t>5/30/2020</a:t>
             </a:fld>
             <a:endParaRPr lang="en-US" dirty="0"/>
           </a:p>
@@ -2632,7 +2632,7 @@
           <a:p>
             <a:fld id="{6587DA83-5663-4C9C-B9AA-0B40A3DAFF81}" type="datetime1">
               <a:rPr lang="en-US" smtClean="0"/>
-              <a:t>5/29/2020</a:t>
+              <a:t>5/30/2020</a:t>
             </a:fld>
             <a:endParaRPr lang="en-US" dirty="0"/>
           </a:p>
@@ -2894,7 +2894,7 @@
           <a:p>
             <a:fld id="{4BE1D723-8F53-4F53-90B0-1982A396982E}" type="datetime1">
               <a:rPr lang="en-US" smtClean="0"/>
-              <a:t>5/29/2020</a:t>
+              <a:t>5/30/2020</a:t>
             </a:fld>
             <a:endParaRPr lang="en-US" dirty="0"/>
           </a:p>
@@ -3223,7 +3223,7 @@
           <a:p>
             <a:fld id="{97669AF7-7BEB-44E4-9852-375E34362B5B}" type="datetime1">
               <a:rPr lang="en-US" smtClean="0"/>
-              <a:t>5/29/2020</a:t>
+              <a:t>5/30/2020</a:t>
             </a:fld>
             <a:endParaRPr lang="en-US" dirty="0"/>
           </a:p>
@@ -3546,7 +3546,7 @@
           <a:p>
             <a:fld id="{BAAAC38D-0552-4C82-B593-E6124DFADBE2}" type="datetime1">
               <a:rPr lang="en-US" smtClean="0"/>
-              <a:t>5/29/2020</a:t>
+              <a:t>5/30/2020</a:t>
             </a:fld>
             <a:endParaRPr lang="en-US" dirty="0"/>
           </a:p>
@@ -4003,7 +4003,7 @@
           <a:p>
             <a:fld id="{D9DF0F1C-5577-4ACB-BB62-DF8F3C494C7E}" type="datetime1">
               <a:rPr lang="en-US" smtClean="0"/>
-              <a:t>5/29/2020</a:t>
+              <a:t>5/30/2020</a:t>
             </a:fld>
             <a:endParaRPr lang="en-US" dirty="0"/>
           </a:p>
@@ -4208,7 +4208,7 @@
           <a:p>
             <a:fld id="{1775B394-D9F9-4F0C-B15D-605F45CB9E9F}" type="datetime1">
               <a:rPr lang="en-US" smtClean="0"/>
-              <a:t>5/29/2020</a:t>
+              <a:t>5/30/2020</a:t>
             </a:fld>
             <a:endParaRPr lang="en-US" dirty="0"/>
           </a:p>
@@ -4385,7 +4385,7 @@
           <a:p>
             <a:fld id="{39667345-2558-425A-8533-9BFDBCE15005}" type="datetime1">
               <a:rPr lang="en-US" smtClean="0"/>
-              <a:t>5/29/2020</a:t>
+              <a:t>5/30/2020</a:t>
             </a:fld>
             <a:endParaRPr lang="en-US" dirty="0"/>
           </a:p>
@@ -4718,7 +4718,7 @@
           <a:p>
             <a:fld id="{92BEA474-078D-4E9B-9B14-09A87B19DC46}" type="datetime1">
               <a:rPr lang="en-US" smtClean="0"/>
-              <a:t>5/29/2020</a:t>
+              <a:t>5/30/2020</a:t>
             </a:fld>
             <a:endParaRPr lang="en-US" dirty="0"/>
           </a:p>
@@ -5064,7 +5064,7 @@
           <a:p>
             <a:fld id="{4907D986-8816-4272-A432-0437A28A9828}" type="datetime1">
               <a:rPr lang="en-US" smtClean="0"/>
-              <a:t>5/29/2020</a:t>
+              <a:t>5/30/2020</a:t>
             </a:fld>
             <a:endParaRPr lang="en-US" dirty="0"/>
           </a:p>
@@ -7182,7 +7182,7 @@
           <a:p>
             <a:fld id="{62D6E202-B606-4609-B914-27C9371A1F6D}" type="datetime1">
               <a:rPr lang="en-US" smtClean="0"/>
-              <a:t>5/29/2020</a:t>
+              <a:t>5/30/2020</a:t>
             </a:fld>
             <a:endParaRPr lang="en-US" dirty="0"/>
           </a:p>
@@ -9698,6 +9698,36 @@
           </a:extLst>
         </p:spPr>
       </p:pic>
+      <p:pic>
+        <p:nvPicPr>
+          <p:cNvPr id="4" name="Picture 3">
+            <a:extLst>
+              <a:ext uri="{FF2B5EF4-FFF2-40B4-BE49-F238E27FC236}">
+                <a16:creationId xmlns:a16="http://schemas.microsoft.com/office/drawing/2014/main" id="{B539D720-7978-42B7-BC97-AEAF9A8B1BC8}"/>
+              </a:ext>
+            </a:extLst>
+          </p:cNvPr>
+          <p:cNvPicPr>
+            <a:picLocks noChangeAspect="1"/>
+          </p:cNvPicPr>
+          <p:nvPr/>
+        </p:nvPicPr>
+        <p:blipFill>
+          <a:blip r:embed="rId4"/>
+          <a:stretch>
+            <a:fillRect/>
+          </a:stretch>
+        </p:blipFill>
+        <p:spPr>
+          <a:xfrm>
+            <a:off x="2512154" y="5465166"/>
+            <a:ext cx="4686300" cy="371475"/>
+          </a:xfrm>
+          <a:prstGeom prst="rect">
+            <a:avLst/>
+          </a:prstGeom>
+        </p:spPr>
+      </p:pic>
     </p:spTree>
     <p:extLst>
       <p:ext uri="{BB962C8B-B14F-4D97-AF65-F5344CB8AC3E}">
@@ -10146,7 +10176,7 @@
         </p:blipFill>
         <p:spPr>
           <a:xfrm>
-            <a:off x="6468291" y="1232154"/>
+            <a:off x="6527412" y="856649"/>
             <a:ext cx="4362450" cy="314325"/>
           </a:xfrm>
           <a:prstGeom prst="rect">
@@ -10184,6 +10214,41 @@
           </a:prstGeom>
         </p:spPr>
       </p:pic>
+      <p:sp>
+        <p:nvSpPr>
+          <p:cNvPr id="11" name="TextBox 10">
+            <a:extLst>
+              <a:ext uri="{FF2B5EF4-FFF2-40B4-BE49-F238E27FC236}">
+                <a16:creationId xmlns:a16="http://schemas.microsoft.com/office/drawing/2014/main" id="{FD592EBF-F4FA-4127-88AD-67098B7543B0}"/>
+              </a:ext>
+            </a:extLst>
+          </p:cNvPr>
+          <p:cNvSpPr txBox="1"/>
+          <p:nvPr/>
+        </p:nvSpPr>
+        <p:spPr>
+          <a:xfrm>
+            <a:off x="6842834" y="1395159"/>
+            <a:ext cx="2483141" cy="369332"/>
+          </a:xfrm>
+          <a:prstGeom prst="rect">
+            <a:avLst/>
+          </a:prstGeom>
+          <a:noFill/>
+        </p:spPr>
+        <p:txBody>
+          <a:bodyPr wrap="square" rtlCol="0">
+            <a:spAutoFit/>
+          </a:bodyPr>
+          <a:lstStyle/>
+          <a:p>
+            <a:r>
+              <a:rPr lang="en-US" b="1" i="1" dirty="0"/>
+              <a:t>Confusion Matrices</a:t>
+            </a:r>
+          </a:p>
+        </p:txBody>
+      </p:sp>
     </p:spTree>
     <p:extLst>
       <p:ext uri="{BB962C8B-B14F-4D97-AF65-F5344CB8AC3E}">
@@ -10621,6 +10686,41 @@
           </a:p>
         </p:txBody>
       </p:sp>
+      <p:sp>
+        <p:nvSpPr>
+          <p:cNvPr id="7" name="TextBox 6">
+            <a:extLst>
+              <a:ext uri="{FF2B5EF4-FFF2-40B4-BE49-F238E27FC236}">
+                <a16:creationId xmlns:a16="http://schemas.microsoft.com/office/drawing/2014/main" id="{A10FE1C3-17A5-48ED-B735-CBA558D85C0D}"/>
+              </a:ext>
+            </a:extLst>
+          </p:cNvPr>
+          <p:cNvSpPr txBox="1"/>
+          <p:nvPr/>
+        </p:nvSpPr>
+        <p:spPr>
+          <a:xfrm>
+            <a:off x="6644081" y="1602297"/>
+            <a:ext cx="2483141" cy="369332"/>
+          </a:xfrm>
+          <a:prstGeom prst="rect">
+            <a:avLst/>
+          </a:prstGeom>
+          <a:noFill/>
+        </p:spPr>
+        <p:txBody>
+          <a:bodyPr wrap="square" rtlCol="0">
+            <a:spAutoFit/>
+          </a:bodyPr>
+          <a:lstStyle/>
+          <a:p>
+            <a:r>
+              <a:rPr lang="en-US" b="1" i="1" dirty="0"/>
+              <a:t>Confusion Matrices</a:t>
+            </a:r>
+          </a:p>
+        </p:txBody>
+      </p:sp>
     </p:spTree>
     <p:extLst>
       <p:ext uri="{BB962C8B-B14F-4D97-AF65-F5344CB8AC3E}">
@@ -11088,6 +11188,41 @@
           <a:p>
             <a:pPr algn="ctr"/>
             <a:endParaRPr lang="en-US"/>
+          </a:p>
+        </p:txBody>
+      </p:sp>
+      <p:sp>
+        <p:nvSpPr>
+          <p:cNvPr id="10" name="TextBox 9">
+            <a:extLst>
+              <a:ext uri="{FF2B5EF4-FFF2-40B4-BE49-F238E27FC236}">
+                <a16:creationId xmlns:a16="http://schemas.microsoft.com/office/drawing/2014/main" id="{B3D4A20C-AD0F-4D2D-BD30-19E1E01A3AA3}"/>
+              </a:ext>
+            </a:extLst>
+          </p:cNvPr>
+          <p:cNvSpPr txBox="1"/>
+          <p:nvPr/>
+        </p:nvSpPr>
+        <p:spPr>
+          <a:xfrm>
+            <a:off x="6644081" y="1602297"/>
+            <a:ext cx="2483141" cy="369332"/>
+          </a:xfrm>
+          <a:prstGeom prst="rect">
+            <a:avLst/>
+          </a:prstGeom>
+          <a:noFill/>
+        </p:spPr>
+        <p:txBody>
+          <a:bodyPr wrap="square" rtlCol="0">
+            <a:spAutoFit/>
+          </a:bodyPr>
+          <a:lstStyle/>
+          <a:p>
+            <a:r>
+              <a:rPr lang="en-US" b="1" i="1" dirty="0"/>
+              <a:t>Confusion Matrices</a:t>
+            </a:r>
           </a:p>
         </p:txBody>
       </p:sp>
@@ -13465,7 +13600,7 @@
               <a:rPr lang="en-US" b="1" dirty="0">
                 <a:latin typeface="Garamond" panose="02020404030301010803" pitchFamily="18" charset="0"/>
               </a:rPr>
-              <a:t>INFERENTIAL STATISTICS</a:t>
+              <a:t>INFERENTIAL STATISTICS(TWO TAILED T-TEST)</a:t>
             </a:r>
           </a:p>
         </p:txBody>
@@ -13489,7 +13624,7 @@
         <p:spPr>
           <a:xfrm>
             <a:off x="2429821" y="1905000"/>
-            <a:ext cx="5835121" cy="3785860"/>
+            <a:ext cx="5835121" cy="4328890"/>
           </a:xfrm>
         </p:spPr>
         <p:txBody>
@@ -13500,7 +13635,24 @@
           <a:p>
             <a:r>
               <a:rPr lang="en-US" dirty="0"/>
-              <a:t>Performed two tailed t-test that 2 independent samples have identical average (expected) values. This is the test for normal version of text and description columns combined. There is a statistically significant difference between male and female average length of words in a text.</a:t>
+              <a:t>Null Hypothesis H</a:t>
+            </a:r>
+            <a:r>
+              <a:rPr lang="en-US" baseline="-25000" dirty="0"/>
+              <a:t>0</a:t>
+            </a:r>
+            <a:r>
+              <a:rPr lang="en-US" dirty="0"/>
+              <a:t> = There is no difference in average length of words for male and female genders(Identical). </a:t>
+            </a:r>
+          </a:p>
+          <a:p>
+            <a:endParaRPr lang="en-US" dirty="0"/>
+          </a:p>
+          <a:p>
+            <a:r>
+              <a:rPr lang="en-US" dirty="0"/>
+              <a:t>There is a statistically significant difference between male and female average length of words in a text.</a:t>
             </a:r>
           </a:p>
           <a:p>
@@ -13515,7 +13667,7 @@
           <a:p>
             <a:r>
               <a:rPr lang="en-US" dirty="0"/>
-              <a:t>This is the test for cleaned version of text and description columns combined. There is a statistically significant difference between male and female average length of words in a text.</a:t>
+              <a:t>There is a statistically significant difference between male and female average length of words in a cleaned version text data.</a:t>
             </a:r>
           </a:p>
           <a:p>
@@ -13548,7 +13700,7 @@
         </p:blipFill>
         <p:spPr>
           <a:xfrm>
-            <a:off x="8264942" y="2849146"/>
+            <a:off x="8631453" y="3520363"/>
             <a:ext cx="2873159" cy="354038"/>
           </a:xfrm>
           <a:prstGeom prst="rect">
@@ -13578,7 +13730,7 @@
         </p:blipFill>
         <p:spPr>
           <a:xfrm>
-            <a:off x="8264942" y="4888962"/>
+            <a:off x="8631453" y="5307037"/>
             <a:ext cx="2873159" cy="300997"/>
           </a:xfrm>
           <a:prstGeom prst="rect">
@@ -13586,6 +13738,94 @@
           </a:prstGeom>
         </p:spPr>
       </p:pic>
+      <p:sp>
+        <p:nvSpPr>
+          <p:cNvPr id="6" name="Right Brace 5">
+            <a:extLst>
+              <a:ext uri="{FF2B5EF4-FFF2-40B4-BE49-F238E27FC236}">
+                <a16:creationId xmlns:a16="http://schemas.microsoft.com/office/drawing/2014/main" id="{7F745566-0D78-4247-99BE-40EDF07637E5}"/>
+              </a:ext>
+            </a:extLst>
+          </p:cNvPr>
+          <p:cNvSpPr/>
+          <p:nvPr/>
+        </p:nvSpPr>
+        <p:spPr>
+          <a:xfrm>
+            <a:off x="8028264" y="3331213"/>
+            <a:ext cx="236678" cy="738232"/>
+          </a:xfrm>
+          <a:prstGeom prst="rightBrace">
+            <a:avLst/>
+          </a:prstGeom>
+        </p:spPr>
+        <p:style>
+          <a:lnRef idx="1">
+            <a:schemeClr val="accent1"/>
+          </a:lnRef>
+          <a:fillRef idx="0">
+            <a:schemeClr val="accent1"/>
+          </a:fillRef>
+          <a:effectRef idx="0">
+            <a:schemeClr val="accent1"/>
+          </a:effectRef>
+          <a:fontRef idx="minor">
+            <a:schemeClr val="tx1"/>
+          </a:fontRef>
+        </p:style>
+        <p:txBody>
+          <a:bodyPr rtlCol="0" anchor="ctr"/>
+          <a:lstStyle/>
+          <a:p>
+            <a:pPr algn="ctr"/>
+            <a:endParaRPr lang="en-US"/>
+          </a:p>
+        </p:txBody>
+      </p:sp>
+      <p:sp>
+        <p:nvSpPr>
+          <p:cNvPr id="7" name="Right Brace 6">
+            <a:extLst>
+              <a:ext uri="{FF2B5EF4-FFF2-40B4-BE49-F238E27FC236}">
+                <a16:creationId xmlns:a16="http://schemas.microsoft.com/office/drawing/2014/main" id="{33BD8ECF-2F7F-4BA6-850F-5AE412AA101E}"/>
+              </a:ext>
+            </a:extLst>
+          </p:cNvPr>
+          <p:cNvSpPr/>
+          <p:nvPr/>
+        </p:nvSpPr>
+        <p:spPr>
+          <a:xfrm>
+            <a:off x="8028264" y="5088420"/>
+            <a:ext cx="236678" cy="738232"/>
+          </a:xfrm>
+          <a:prstGeom prst="rightBrace">
+            <a:avLst/>
+          </a:prstGeom>
+        </p:spPr>
+        <p:style>
+          <a:lnRef idx="1">
+            <a:schemeClr val="accent1"/>
+          </a:lnRef>
+          <a:fillRef idx="0">
+            <a:schemeClr val="accent1"/>
+          </a:fillRef>
+          <a:effectRef idx="0">
+            <a:schemeClr val="accent1"/>
+          </a:effectRef>
+          <a:fontRef idx="minor">
+            <a:schemeClr val="tx1"/>
+          </a:fontRef>
+        </p:style>
+        <p:txBody>
+          <a:bodyPr rtlCol="0" anchor="ctr"/>
+          <a:lstStyle/>
+          <a:p>
+            <a:pPr algn="ctr"/>
+            <a:endParaRPr lang="en-US"/>
+          </a:p>
+        </p:txBody>
+      </p:sp>
     </p:spTree>
     <p:extLst>
       <p:ext uri="{BB962C8B-B14F-4D97-AF65-F5344CB8AC3E}">
@@ -13703,25 +13943,17 @@
         </p:spPr>
         <p:txBody>
           <a:bodyPr>
-            <a:normAutofit fontScale="92500" lnSpcReduction="20000"/>
+            <a:normAutofit fontScale="92500" lnSpcReduction="10000"/>
           </a:bodyPr>
           <a:lstStyle/>
           <a:p>
-            <a:r>
-              <a:rPr lang="en-US" b="1" dirty="0">
-                <a:solidFill>
-                  <a:srgbClr val="000000"/>
-                </a:solidFill>
-              </a:rPr>
-              <a:t>Vectorization</a:t>
-            </a:r>
             <a:r>
               <a:rPr lang="en-US" dirty="0">
                 <a:solidFill>
                   <a:srgbClr val="000000"/>
                 </a:solidFill>
               </a:rPr>
-              <a:t>: Converting a collection of text documents into numerical feature vectors.</a:t>
+              <a:t>Converts text to a matrix where every row is an observation and every feature is a unique word.</a:t>
             </a:r>
           </a:p>
           <a:p>
@@ -13747,7 +13979,7 @@
                   <a:srgbClr val="000000"/>
                 </a:solidFill>
               </a:rPr>
-              <a:t> on the features/predictors which will be useful in ML models </a:t>
+              <a:t> on the features/predictors which will be useful in ML models which also performs </a:t>
             </a:r>
             <a:r>
               <a:rPr lang="en-US" dirty="0">
@@ -13755,7 +13987,7 @@
                   <a:schemeClr val="tx1"/>
                 </a:solidFill>
               </a:rPr>
-              <a:t>for both tokenization and occurrence counting in a single class. It counts the word frequencies.</a:t>
+              <a:t>tokenization. It counts the word frequencies.</a:t>
             </a:r>
           </a:p>
           <a:p>

</xml_diff>

<commit_message>
Minimal Changes of content in the slides
</commit_message>
<xml_diff>
--- a/Capstone_Project_2_ppt.pptx
+++ b/Capstone_Project_2_ppt.pptx
@@ -317,7 +317,7 @@
           <a:p>
             <a:fld id="{9184DA70-C731-4C70-880D-CCD4705E623C}" type="datetime1">
               <a:rPr lang="en-US" smtClean="0"/>
-              <a:t>5/30/2020</a:t>
+              <a:t>5/31/2020</a:t>
             </a:fld>
             <a:endParaRPr lang="en-US" dirty="0"/>
           </a:p>
@@ -655,7 +655,7 @@
           <a:p>
             <a:fld id="{62D6E202-B606-4609-B914-27C9371A1F6D}" type="datetime1">
               <a:rPr lang="en-US" smtClean="0"/>
-              <a:t>5/30/2020</a:t>
+              <a:t>5/31/2020</a:t>
             </a:fld>
             <a:endParaRPr lang="en-US" dirty="0"/>
           </a:p>
@@ -1057,7 +1057,7 @@
           <a:p>
             <a:fld id="{62D6E202-B606-4609-B914-27C9371A1F6D}" type="datetime1">
               <a:rPr lang="en-US" smtClean="0"/>
-              <a:t>5/30/2020</a:t>
+              <a:t>5/31/2020</a:t>
             </a:fld>
             <a:endParaRPr lang="en-US" dirty="0"/>
           </a:p>
@@ -1394,7 +1394,7 @@
           <a:p>
             <a:fld id="{62D6E202-B606-4609-B914-27C9371A1F6D}" type="datetime1">
               <a:rPr lang="en-US" smtClean="0"/>
-              <a:t>5/30/2020</a:t>
+              <a:t>5/31/2020</a:t>
             </a:fld>
             <a:endParaRPr lang="en-US" dirty="0"/>
           </a:p>
@@ -1715,7 +1715,7 @@
           <a:p>
             <a:fld id="{62D6E202-B606-4609-B914-27C9371A1F6D}" type="datetime1">
               <a:rPr lang="en-US" smtClean="0"/>
-              <a:t>5/30/2020</a:t>
+              <a:t>5/31/2020</a:t>
             </a:fld>
             <a:endParaRPr lang="en-US" dirty="0"/>
           </a:p>
@@ -2112,7 +2112,7 @@
           <a:p>
             <a:fld id="{62D6E202-B606-4609-B914-27C9371A1F6D}" type="datetime1">
               <a:rPr lang="en-US" smtClean="0"/>
-              <a:t>5/30/2020</a:t>
+              <a:t>5/31/2020</a:t>
             </a:fld>
             <a:endParaRPr lang="en-US" dirty="0"/>
           </a:p>
@@ -2370,7 +2370,7 @@
           <a:p>
             <a:fld id="{B612A279-0833-481D-8C56-F67FD0AC6C50}" type="datetime1">
               <a:rPr lang="en-US" smtClean="0"/>
-              <a:t>5/30/2020</a:t>
+              <a:t>5/31/2020</a:t>
             </a:fld>
             <a:endParaRPr lang="en-US" dirty="0"/>
           </a:p>
@@ -2632,7 +2632,7 @@
           <a:p>
             <a:fld id="{6587DA83-5663-4C9C-B9AA-0B40A3DAFF81}" type="datetime1">
               <a:rPr lang="en-US" smtClean="0"/>
-              <a:t>5/30/2020</a:t>
+              <a:t>5/31/2020</a:t>
             </a:fld>
             <a:endParaRPr lang="en-US" dirty="0"/>
           </a:p>
@@ -2894,7 +2894,7 @@
           <a:p>
             <a:fld id="{4BE1D723-8F53-4F53-90B0-1982A396982E}" type="datetime1">
               <a:rPr lang="en-US" smtClean="0"/>
-              <a:t>5/30/2020</a:t>
+              <a:t>5/31/2020</a:t>
             </a:fld>
             <a:endParaRPr lang="en-US" dirty="0"/>
           </a:p>
@@ -3223,7 +3223,7 @@
           <a:p>
             <a:fld id="{97669AF7-7BEB-44E4-9852-375E34362B5B}" type="datetime1">
               <a:rPr lang="en-US" smtClean="0"/>
-              <a:t>5/30/2020</a:t>
+              <a:t>5/31/2020</a:t>
             </a:fld>
             <a:endParaRPr lang="en-US" dirty="0"/>
           </a:p>
@@ -3546,7 +3546,7 @@
           <a:p>
             <a:fld id="{BAAAC38D-0552-4C82-B593-E6124DFADBE2}" type="datetime1">
               <a:rPr lang="en-US" smtClean="0"/>
-              <a:t>5/30/2020</a:t>
+              <a:t>5/31/2020</a:t>
             </a:fld>
             <a:endParaRPr lang="en-US" dirty="0"/>
           </a:p>
@@ -4003,7 +4003,7 @@
           <a:p>
             <a:fld id="{D9DF0F1C-5577-4ACB-BB62-DF8F3C494C7E}" type="datetime1">
               <a:rPr lang="en-US" smtClean="0"/>
-              <a:t>5/30/2020</a:t>
+              <a:t>5/31/2020</a:t>
             </a:fld>
             <a:endParaRPr lang="en-US" dirty="0"/>
           </a:p>
@@ -4208,7 +4208,7 @@
           <a:p>
             <a:fld id="{1775B394-D9F9-4F0C-B15D-605F45CB9E9F}" type="datetime1">
               <a:rPr lang="en-US" smtClean="0"/>
-              <a:t>5/30/2020</a:t>
+              <a:t>5/31/2020</a:t>
             </a:fld>
             <a:endParaRPr lang="en-US" dirty="0"/>
           </a:p>
@@ -4385,7 +4385,7 @@
           <a:p>
             <a:fld id="{39667345-2558-425A-8533-9BFDBCE15005}" type="datetime1">
               <a:rPr lang="en-US" smtClean="0"/>
-              <a:t>5/30/2020</a:t>
+              <a:t>5/31/2020</a:t>
             </a:fld>
             <a:endParaRPr lang="en-US" dirty="0"/>
           </a:p>
@@ -4718,7 +4718,7 @@
           <a:p>
             <a:fld id="{92BEA474-078D-4E9B-9B14-09A87B19DC46}" type="datetime1">
               <a:rPr lang="en-US" smtClean="0"/>
-              <a:t>5/30/2020</a:t>
+              <a:t>5/31/2020</a:t>
             </a:fld>
             <a:endParaRPr lang="en-US" dirty="0"/>
           </a:p>
@@ -5064,7 +5064,7 @@
           <a:p>
             <a:fld id="{4907D986-8816-4272-A432-0437A28A9828}" type="datetime1">
               <a:rPr lang="en-US" smtClean="0"/>
-              <a:t>5/30/2020</a:t>
+              <a:t>5/31/2020</a:t>
             </a:fld>
             <a:endParaRPr lang="en-US" dirty="0"/>
           </a:p>
@@ -7182,7 +7182,7 @@
           <a:p>
             <a:fld id="{62D6E202-B606-4609-B914-27C9371A1F6D}" type="datetime1">
               <a:rPr lang="en-US" smtClean="0"/>
-              <a:t>5/30/2020</a:t>
+              <a:t>5/31/2020</a:t>
             </a:fld>
             <a:endParaRPr lang="en-US" dirty="0"/>
           </a:p>
@@ -9845,7 +9845,7 @@
         <p:spPr>
           <a:xfrm>
             <a:off x="1683956" y="1811144"/>
-            <a:ext cx="4140772" cy="4422745"/>
+            <a:ext cx="4096059" cy="4422745"/>
           </a:xfrm>
         </p:spPr>
         <p:txBody>
@@ -9954,7 +9954,7 @@
         </p:blipFill>
         <p:spPr bwMode="auto">
           <a:xfrm>
-            <a:off x="6367274" y="1712425"/>
+            <a:off x="6367274" y="1720814"/>
             <a:ext cx="3434263" cy="2367834"/>
           </a:xfrm>
           <a:prstGeom prst="rect">
@@ -11982,7 +11982,7 @@
                   <a:srgbClr val="000000"/>
                 </a:solidFill>
               </a:rPr>
-              <a:t>Summary of the model’s performances.</a:t>
+              <a:t>Summary of the model’s performances. I used 5 epochs for the final accuracy.</a:t>
             </a:r>
           </a:p>
           <a:p>
@@ -11992,7 +11992,7 @@
                   <a:srgbClr val="000000"/>
                 </a:solidFill>
               </a:rPr>
-              <a:t>Accuracy of the Transfer Learning model approach, fine tuned until 4 layers. </a:t>
+              <a:t>Using more epochs is causing the data to overfit. So had to early stop. </a:t>
             </a:r>
           </a:p>
           <a:p>
@@ -12938,7 +12938,7 @@
         </p:spPr>
         <p:txBody>
           <a:bodyPr>
-            <a:normAutofit/>
+            <a:normAutofit fontScale="92500" lnSpcReduction="10000"/>
           </a:bodyPr>
           <a:lstStyle/>
           <a:p>
@@ -12958,7 +12958,17 @@
                   <a:schemeClr val="tx1"/>
                 </a:solidFill>
               </a:rPr>
-              <a:t>Applied techniques like Lemmatization, Tokenization and stop words to create a feature with the words which is understandable.</a:t>
+              <a:t>Applied techniques like Lemmatization, Tokenization and stop words.</a:t>
+            </a:r>
+          </a:p>
+          <a:p>
+            <a:r>
+              <a:rPr lang="en-US" sz="1600" dirty="0">
+                <a:solidFill>
+                  <a:schemeClr val="tx1"/>
+                </a:solidFill>
+              </a:rPr>
+              <a:t>The above methods reduce the number of words in the vocabulary, in order to make it suitable for standard ML algorithms .</a:t>
             </a:r>
           </a:p>
           <a:p>
@@ -13700,8 +13710,8 @@
         </p:blipFill>
         <p:spPr>
           <a:xfrm>
-            <a:off x="8631453" y="3520363"/>
-            <a:ext cx="2873159" cy="354038"/>
+            <a:off x="8363824" y="3388868"/>
+            <a:ext cx="3719636" cy="622921"/>
           </a:xfrm>
           <a:prstGeom prst="rect">
             <a:avLst/>
@@ -13730,8 +13740,8 @@
         </p:blipFill>
         <p:spPr>
           <a:xfrm>
-            <a:off x="8631453" y="5307037"/>
-            <a:ext cx="2873159" cy="300997"/>
+            <a:off x="8325599" y="5156539"/>
+            <a:ext cx="3757861" cy="522808"/>
           </a:xfrm>
           <a:prstGeom prst="rect">
             <a:avLst/>

</xml_diff>

<commit_message>
Rearranged 2 slides in the presentation
</commit_message>
<xml_diff>
--- a/Capstone_Project_2_ppt.pptx
+++ b/Capstone_Project_2_ppt.pptx
@@ -14,12 +14,12 @@
     <p:sldId id="264" r:id="rId8"/>
     <p:sldId id="263" r:id="rId9"/>
     <p:sldId id="262" r:id="rId10"/>
-    <p:sldId id="267" r:id="rId11"/>
-    <p:sldId id="266" r:id="rId12"/>
-    <p:sldId id="265" r:id="rId13"/>
-    <p:sldId id="269" r:id="rId14"/>
-    <p:sldId id="268" r:id="rId15"/>
-    <p:sldId id="270" r:id="rId16"/>
+    <p:sldId id="265" r:id="rId11"/>
+    <p:sldId id="269" r:id="rId12"/>
+    <p:sldId id="268" r:id="rId13"/>
+    <p:sldId id="270" r:id="rId14"/>
+    <p:sldId id="267" r:id="rId15"/>
+    <p:sldId id="266" r:id="rId16"/>
     <p:sldId id="271" r:id="rId17"/>
     <p:sldId id="272" r:id="rId18"/>
     <p:sldId id="273" r:id="rId19"/>
@@ -317,7 +317,7 @@
           <a:p>
             <a:fld id="{9184DA70-C731-4C70-880D-CCD4705E623C}" type="datetime1">
               <a:rPr lang="en-US" smtClean="0"/>
-              <a:t>5/31/2020</a:t>
+              <a:t>6/1/2020</a:t>
             </a:fld>
             <a:endParaRPr lang="en-US" dirty="0"/>
           </a:p>
@@ -655,7 +655,7 @@
           <a:p>
             <a:fld id="{62D6E202-B606-4609-B914-27C9371A1F6D}" type="datetime1">
               <a:rPr lang="en-US" smtClean="0"/>
-              <a:t>5/31/2020</a:t>
+              <a:t>6/1/2020</a:t>
             </a:fld>
             <a:endParaRPr lang="en-US" dirty="0"/>
           </a:p>
@@ -1057,7 +1057,7 @@
           <a:p>
             <a:fld id="{62D6E202-B606-4609-B914-27C9371A1F6D}" type="datetime1">
               <a:rPr lang="en-US" smtClean="0"/>
-              <a:t>5/31/2020</a:t>
+              <a:t>6/1/2020</a:t>
             </a:fld>
             <a:endParaRPr lang="en-US" dirty="0"/>
           </a:p>
@@ -1394,7 +1394,7 @@
           <a:p>
             <a:fld id="{62D6E202-B606-4609-B914-27C9371A1F6D}" type="datetime1">
               <a:rPr lang="en-US" smtClean="0"/>
-              <a:t>5/31/2020</a:t>
+              <a:t>6/1/2020</a:t>
             </a:fld>
             <a:endParaRPr lang="en-US" dirty="0"/>
           </a:p>
@@ -1715,7 +1715,7 @@
           <a:p>
             <a:fld id="{62D6E202-B606-4609-B914-27C9371A1F6D}" type="datetime1">
               <a:rPr lang="en-US" smtClean="0"/>
-              <a:t>5/31/2020</a:t>
+              <a:t>6/1/2020</a:t>
             </a:fld>
             <a:endParaRPr lang="en-US" dirty="0"/>
           </a:p>
@@ -2112,7 +2112,7 @@
           <a:p>
             <a:fld id="{62D6E202-B606-4609-B914-27C9371A1F6D}" type="datetime1">
               <a:rPr lang="en-US" smtClean="0"/>
-              <a:t>5/31/2020</a:t>
+              <a:t>6/1/2020</a:t>
             </a:fld>
             <a:endParaRPr lang="en-US" dirty="0"/>
           </a:p>
@@ -2370,7 +2370,7 @@
           <a:p>
             <a:fld id="{B612A279-0833-481D-8C56-F67FD0AC6C50}" type="datetime1">
               <a:rPr lang="en-US" smtClean="0"/>
-              <a:t>5/31/2020</a:t>
+              <a:t>6/1/2020</a:t>
             </a:fld>
             <a:endParaRPr lang="en-US" dirty="0"/>
           </a:p>
@@ -2632,7 +2632,7 @@
           <a:p>
             <a:fld id="{6587DA83-5663-4C9C-B9AA-0B40A3DAFF81}" type="datetime1">
               <a:rPr lang="en-US" smtClean="0"/>
-              <a:t>5/31/2020</a:t>
+              <a:t>6/1/2020</a:t>
             </a:fld>
             <a:endParaRPr lang="en-US" dirty="0"/>
           </a:p>
@@ -2894,7 +2894,7 @@
           <a:p>
             <a:fld id="{4BE1D723-8F53-4F53-90B0-1982A396982E}" type="datetime1">
               <a:rPr lang="en-US" smtClean="0"/>
-              <a:t>5/31/2020</a:t>
+              <a:t>6/1/2020</a:t>
             </a:fld>
             <a:endParaRPr lang="en-US" dirty="0"/>
           </a:p>
@@ -3223,7 +3223,7 @@
           <a:p>
             <a:fld id="{97669AF7-7BEB-44E4-9852-375E34362B5B}" type="datetime1">
               <a:rPr lang="en-US" smtClean="0"/>
-              <a:t>5/31/2020</a:t>
+              <a:t>6/1/2020</a:t>
             </a:fld>
             <a:endParaRPr lang="en-US" dirty="0"/>
           </a:p>
@@ -3546,7 +3546,7 @@
           <a:p>
             <a:fld id="{BAAAC38D-0552-4C82-B593-E6124DFADBE2}" type="datetime1">
               <a:rPr lang="en-US" smtClean="0"/>
-              <a:t>5/31/2020</a:t>
+              <a:t>6/1/2020</a:t>
             </a:fld>
             <a:endParaRPr lang="en-US" dirty="0"/>
           </a:p>
@@ -4003,7 +4003,7 @@
           <a:p>
             <a:fld id="{D9DF0F1C-5577-4ACB-BB62-DF8F3C494C7E}" type="datetime1">
               <a:rPr lang="en-US" smtClean="0"/>
-              <a:t>5/31/2020</a:t>
+              <a:t>6/1/2020</a:t>
             </a:fld>
             <a:endParaRPr lang="en-US" dirty="0"/>
           </a:p>
@@ -4208,7 +4208,7 @@
           <a:p>
             <a:fld id="{1775B394-D9F9-4F0C-B15D-605F45CB9E9F}" type="datetime1">
               <a:rPr lang="en-US" smtClean="0"/>
-              <a:t>5/31/2020</a:t>
+              <a:t>6/1/2020</a:t>
             </a:fld>
             <a:endParaRPr lang="en-US" dirty="0"/>
           </a:p>
@@ -4385,7 +4385,7 @@
           <a:p>
             <a:fld id="{39667345-2558-425A-8533-9BFDBCE15005}" type="datetime1">
               <a:rPr lang="en-US" smtClean="0"/>
-              <a:t>5/31/2020</a:t>
+              <a:t>6/1/2020</a:t>
             </a:fld>
             <a:endParaRPr lang="en-US" dirty="0"/>
           </a:p>
@@ -4718,7 +4718,7 @@
           <a:p>
             <a:fld id="{92BEA474-078D-4E9B-9B14-09A87B19DC46}" type="datetime1">
               <a:rPr lang="en-US" smtClean="0"/>
-              <a:t>5/31/2020</a:t>
+              <a:t>6/1/2020</a:t>
             </a:fld>
             <a:endParaRPr lang="en-US" dirty="0"/>
           </a:p>
@@ -5064,7 +5064,7 @@
           <a:p>
             <a:fld id="{4907D986-8816-4272-A432-0437A28A9828}" type="datetime1">
               <a:rPr lang="en-US" smtClean="0"/>
-              <a:t>5/31/2020</a:t>
+              <a:t>6/1/2020</a:t>
             </a:fld>
             <a:endParaRPr lang="en-US" dirty="0"/>
           </a:p>
@@ -7182,7 +7182,7 @@
           <a:p>
             <a:fld id="{62D6E202-B606-4609-B914-27C9371A1F6D}" type="datetime1">
               <a:rPr lang="en-US" smtClean="0"/>
-              <a:t>5/31/2020</a:t>
+              <a:t>6/1/2020</a:t>
             </a:fld>
             <a:endParaRPr lang="en-US" dirty="0"/>
           </a:p>
@@ -9273,7 +9273,7 @@
           <p:cNvPr id="2" name="Title 1">
             <a:extLst>
               <a:ext uri="{FF2B5EF4-FFF2-40B4-BE49-F238E27FC236}">
-                <a16:creationId xmlns:a16="http://schemas.microsoft.com/office/drawing/2014/main" id="{986FCF57-4250-4C61-A156-6697F58E851A}"/>
+                <a16:creationId xmlns:a16="http://schemas.microsoft.com/office/drawing/2014/main" id="{332B7FDF-1B2E-4942-9C97-3748AE36ACBA}"/>
               </a:ext>
             </a:extLst>
           </p:cNvPr>
@@ -9287,12 +9287,12 @@
         <p:spPr>
           <a:xfrm>
             <a:off x="1687669" y="624110"/>
-            <a:ext cx="4217053" cy="1280890"/>
+            <a:ext cx="4137059" cy="1280890"/>
           </a:xfrm>
         </p:spPr>
         <p:txBody>
           <a:bodyPr>
-            <a:noAutofit/>
+            <a:normAutofit/>
           </a:bodyPr>
           <a:lstStyle/>
           <a:p>
@@ -9302,10 +9302,10 @@
               </a:lnSpc>
             </a:pPr>
             <a:r>
-              <a:rPr lang="en-US" sz="2400" b="1" dirty="0">
+              <a:rPr lang="en-US" sz="2700" b="1">
                 <a:latin typeface="Garamond" panose="02020404030301010803" pitchFamily="18" charset="0"/>
               </a:rPr>
-              <a:t>USING FASTAI FOR PREDICTIVE MODELLING (TRANSFER LEARNING) </a:t>
+              <a:t>LOGISTIC REGRESSION MODEL</a:t>
             </a:r>
           </a:p>
         </p:txBody>
@@ -9315,7 +9315,7 @@
           <p:cNvPr id="3" name="Content Placeholder 2">
             <a:extLst>
               <a:ext uri="{FF2B5EF4-FFF2-40B4-BE49-F238E27FC236}">
-                <a16:creationId xmlns:a16="http://schemas.microsoft.com/office/drawing/2014/main" id="{5757FEE5-89AF-4D79-BA9B-9074DB570FEC}"/>
+                <a16:creationId xmlns:a16="http://schemas.microsoft.com/office/drawing/2014/main" id="{0FBF52AF-46F1-4417-A90D-F79B7138A5A2}"/>
               </a:ext>
             </a:extLst>
           </p:cNvPr>
@@ -9328,47 +9328,94 @@
         </p:nvSpPr>
         <p:spPr>
           <a:xfrm>
-            <a:off x="1687669" y="2121376"/>
-            <a:ext cx="4141673" cy="4112514"/>
+            <a:off x="1683956" y="1811144"/>
+            <a:ext cx="4096059" cy="4422745"/>
           </a:xfrm>
         </p:spPr>
         <p:txBody>
           <a:bodyPr>
-            <a:normAutofit lnSpcReduction="10000"/>
+            <a:normAutofit fontScale="92500" lnSpcReduction="20000"/>
           </a:bodyPr>
           <a:lstStyle/>
           <a:p>
             <a:r>
-              <a:rPr lang="en-US" dirty="0"/>
-              <a:t>Transfer learning is a machine learning method where a model developed for a task is reused as the starting point for a model on a second task.</a:t>
-            </a:r>
-          </a:p>
-          <a:p>
-            <a:r>
-              <a:rPr lang="en-US" dirty="0"/>
-              <a:t>Used Google Colab notebooks since it’s on cloud as has GPU as runtime. </a:t>
-            </a:r>
-          </a:p>
-          <a:p>
-            <a:r>
-              <a:rPr lang="en-US" dirty="0"/>
-              <a:t>TextLMDataBunch used to get the data ready for a language model</a:t>
-            </a:r>
-          </a:p>
-          <a:p>
-            <a:r>
-              <a:rPr lang="en-US" dirty="0"/>
-              <a:t>TextClasDataBunch used to get the data ready for a text classifier</a:t>
-            </a:r>
+              <a:rPr lang="en-US" dirty="0">
+                <a:solidFill>
+                  <a:srgbClr val="000000"/>
+                </a:solidFill>
+              </a:rPr>
+              <a:t>Optimized Parameters using GridSearchCV using 5 folds (penalty = 'l1', C= 0.1)</a:t>
+            </a:r>
+          </a:p>
+          <a:p>
+            <a:r>
+              <a:rPr lang="en-US" dirty="0">
+                <a:solidFill>
+                  <a:srgbClr val="000000"/>
+                </a:solidFill>
+              </a:rPr>
+              <a:t>This result is for the original tweets(non cleaned version of text and description combined)</a:t>
+            </a:r>
+          </a:p>
+          <a:p>
+            <a:endParaRPr lang="en-US" dirty="0">
+              <a:solidFill>
+                <a:srgbClr val="000000"/>
+              </a:solidFill>
+            </a:endParaRPr>
+          </a:p>
+          <a:p>
+            <a:endParaRPr lang="en-US" dirty="0">
+              <a:solidFill>
+                <a:srgbClr val="000000"/>
+              </a:solidFill>
+            </a:endParaRPr>
+          </a:p>
+          <a:p>
+            <a:endParaRPr lang="en-US" dirty="0">
+              <a:solidFill>
+                <a:srgbClr val="000000"/>
+              </a:solidFill>
+            </a:endParaRPr>
+          </a:p>
+          <a:p>
+            <a:r>
+              <a:rPr lang="en-US" dirty="0">
+                <a:solidFill>
+                  <a:srgbClr val="000000"/>
+                </a:solidFill>
+              </a:rPr>
+              <a:t>Optimized Parameters using GridSearchCV using 5 folds (penalty = 'l1', C= 0.1)</a:t>
+            </a:r>
+          </a:p>
+          <a:p>
+            <a:r>
+              <a:rPr lang="en-US" dirty="0">
+                <a:solidFill>
+                  <a:srgbClr val="000000"/>
+                </a:solidFill>
+              </a:rPr>
+              <a:t>This result is for the cleaned tweets(using process of Lemmatization, tokenization, stop words)</a:t>
+            </a:r>
+          </a:p>
+          <a:p>
+            <a:pPr marL="0" indent="0">
+              <a:buNone/>
+            </a:pPr>
+            <a:endParaRPr lang="en-US" dirty="0">
+              <a:solidFill>
+                <a:srgbClr val="000000"/>
+              </a:solidFill>
+            </a:endParaRPr>
           </a:p>
         </p:txBody>
       </p:sp>
       <p:pic>
         <p:nvPicPr>
-          <p:cNvPr id="1032" name="Picture 8">
+          <p:cNvPr id="1026" name="Picture 2">
             <a:extLst>
               <a:ext uri="{FF2B5EF4-FFF2-40B4-BE49-F238E27FC236}">
-                <a16:creationId xmlns:a16="http://schemas.microsoft.com/office/drawing/2014/main" id="{3E04472B-9819-4F88-B311-FFC5C509F94A}"/>
+                <a16:creationId xmlns:a16="http://schemas.microsoft.com/office/drawing/2014/main" id="{A4A8BA8F-7EAA-4FA0-B97D-4E7098284D4E}"/>
               </a:ext>
             </a:extLst>
           </p:cNvPr>
@@ -9385,15 +9432,14 @@
               </a:ext>
             </a:extLst>
           </a:blip>
-          <a:srcRect/>
           <a:stretch>
             <a:fillRect/>
           </a:stretch>
         </p:blipFill>
         <p:spPr bwMode="auto">
           <a:xfrm>
-            <a:off x="5904722" y="2121376"/>
-            <a:ext cx="5943600" cy="1019175"/>
+            <a:off x="6367274" y="1720814"/>
+            <a:ext cx="3434263" cy="2367834"/>
           </a:xfrm>
           <a:prstGeom prst="rect">
             <a:avLst/>
@@ -9412,10 +9458,10 @@
       </p:pic>
       <p:pic>
         <p:nvPicPr>
-          <p:cNvPr id="1034" name="Picture 10">
+          <p:cNvPr id="1028" name="Picture 4">
             <a:extLst>
               <a:ext uri="{FF2B5EF4-FFF2-40B4-BE49-F238E27FC236}">
-                <a16:creationId xmlns:a16="http://schemas.microsoft.com/office/drawing/2014/main" id="{254DEA3B-0DA2-4CFB-90F9-2411E7691446}"/>
+                <a16:creationId xmlns:a16="http://schemas.microsoft.com/office/drawing/2014/main" id="{18257F34-5191-48AD-BE65-A929F0A438D4}"/>
               </a:ext>
             </a:extLst>
           </p:cNvPr>
@@ -9439,8 +9485,8 @@
         </p:blipFill>
         <p:spPr bwMode="auto">
           <a:xfrm>
-            <a:off x="5904722" y="4094001"/>
-            <a:ext cx="6143625" cy="666750"/>
+            <a:off x="9801537" y="2154346"/>
+            <a:ext cx="2176651" cy="1274654"/>
           </a:xfrm>
           <a:prstGeom prst="rect">
             <a:avLst/>
@@ -9457,10 +9503,240 @@
           </a:extLst>
         </p:spPr>
       </p:pic>
+      <p:sp>
+        <p:nvSpPr>
+          <p:cNvPr id="4" name="Right Brace 3">
+            <a:extLst>
+              <a:ext uri="{FF2B5EF4-FFF2-40B4-BE49-F238E27FC236}">
+                <a16:creationId xmlns:a16="http://schemas.microsoft.com/office/drawing/2014/main" id="{FC0A15F3-EF98-4061-9BE2-0D635650D2E3}"/>
+              </a:ext>
+            </a:extLst>
+          </p:cNvPr>
+          <p:cNvSpPr/>
+          <p:nvPr/>
+        </p:nvSpPr>
+        <p:spPr>
+          <a:xfrm>
+            <a:off x="5503178" y="1644242"/>
+            <a:ext cx="864096" cy="2265028"/>
+          </a:xfrm>
+          <a:prstGeom prst="rightBrace">
+            <a:avLst/>
+          </a:prstGeom>
+        </p:spPr>
+        <p:style>
+          <a:lnRef idx="1">
+            <a:schemeClr val="accent1"/>
+          </a:lnRef>
+          <a:fillRef idx="0">
+            <a:schemeClr val="accent1"/>
+          </a:fillRef>
+          <a:effectRef idx="0">
+            <a:schemeClr val="accent1"/>
+          </a:effectRef>
+          <a:fontRef idx="minor">
+            <a:schemeClr val="tx1"/>
+          </a:fontRef>
+        </p:style>
+        <p:txBody>
+          <a:bodyPr rtlCol="0" anchor="ctr"/>
+          <a:lstStyle/>
+          <a:p>
+            <a:pPr algn="ctr"/>
+            <a:endParaRPr lang="en-US"/>
+          </a:p>
+        </p:txBody>
+      </p:sp>
+      <p:pic>
+        <p:nvPicPr>
+          <p:cNvPr id="1030" name="Picture 6">
+            <a:extLst>
+              <a:ext uri="{FF2B5EF4-FFF2-40B4-BE49-F238E27FC236}">
+                <a16:creationId xmlns:a16="http://schemas.microsoft.com/office/drawing/2014/main" id="{48B919C5-C0BB-4472-95D5-499A52F3BCDA}"/>
+              </a:ext>
+            </a:extLst>
+          </p:cNvPr>
+          <p:cNvPicPr>
+            <a:picLocks noChangeAspect="1" noChangeArrowheads="1"/>
+          </p:cNvPicPr>
+          <p:nvPr/>
+        </p:nvPicPr>
+        <p:blipFill>
+          <a:blip r:embed="rId4">
+            <a:extLst>
+              <a:ext uri="{28A0092B-C50C-407E-A947-70E740481C1C}">
+                <a14:useLocalDpi xmlns:a14="http://schemas.microsoft.com/office/drawing/2010/main" val="0"/>
+              </a:ext>
+            </a:extLst>
+          </a:blip>
+          <a:srcRect/>
+          <a:stretch>
+            <a:fillRect/>
+          </a:stretch>
+        </p:blipFill>
+        <p:spPr bwMode="auto">
+          <a:xfrm>
+            <a:off x="6513032" y="4245429"/>
+            <a:ext cx="3288505" cy="2267338"/>
+          </a:xfrm>
+          <a:prstGeom prst="rect">
+            <a:avLst/>
+          </a:prstGeom>
+          <a:noFill/>
+          <a:extLst>
+            <a:ext uri="{909E8E84-426E-40DD-AFC4-6F175D3DCCD1}">
+              <a14:hiddenFill xmlns:a14="http://schemas.microsoft.com/office/drawing/2010/main">
+                <a:solidFill>
+                  <a:srgbClr val="FFFFFF"/>
+                </a:solidFill>
+              </a14:hiddenFill>
+            </a:ext>
+          </a:extLst>
+        </p:spPr>
+      </p:pic>
+      <p:sp>
+        <p:nvSpPr>
+          <p:cNvPr id="5" name="Right Brace 4">
+            <a:extLst>
+              <a:ext uri="{FF2B5EF4-FFF2-40B4-BE49-F238E27FC236}">
+                <a16:creationId xmlns:a16="http://schemas.microsoft.com/office/drawing/2014/main" id="{72F64266-154C-42B2-9521-46E7877FE893}"/>
+              </a:ext>
+            </a:extLst>
+          </p:cNvPr>
+          <p:cNvSpPr/>
+          <p:nvPr/>
+        </p:nvSpPr>
+        <p:spPr>
+          <a:xfrm>
+            <a:off x="5503178" y="4152122"/>
+            <a:ext cx="864096" cy="2081767"/>
+          </a:xfrm>
+          <a:prstGeom prst="rightBrace">
+            <a:avLst/>
+          </a:prstGeom>
+        </p:spPr>
+        <p:style>
+          <a:lnRef idx="1">
+            <a:schemeClr val="accent1"/>
+          </a:lnRef>
+          <a:fillRef idx="0">
+            <a:schemeClr val="accent1"/>
+          </a:fillRef>
+          <a:effectRef idx="0">
+            <a:schemeClr val="accent1"/>
+          </a:effectRef>
+          <a:fontRef idx="minor">
+            <a:schemeClr val="tx1"/>
+          </a:fontRef>
+        </p:style>
+        <p:txBody>
+          <a:bodyPr rtlCol="0" anchor="ctr"/>
+          <a:lstStyle/>
+          <a:p>
+            <a:pPr algn="ctr"/>
+            <a:endParaRPr lang="en-US"/>
+          </a:p>
+        </p:txBody>
+      </p:sp>
+      <p:pic>
+        <p:nvPicPr>
+          <p:cNvPr id="6" name="Picture 5">
+            <a:extLst>
+              <a:ext uri="{FF2B5EF4-FFF2-40B4-BE49-F238E27FC236}">
+                <a16:creationId xmlns:a16="http://schemas.microsoft.com/office/drawing/2014/main" id="{05AD3C33-D6ED-4A2C-B66A-53338F5D73A0}"/>
+              </a:ext>
+            </a:extLst>
+          </p:cNvPr>
+          <p:cNvPicPr>
+            <a:picLocks noChangeAspect="1"/>
+          </p:cNvPicPr>
+          <p:nvPr/>
+        </p:nvPicPr>
+        <p:blipFill>
+          <a:blip r:embed="rId5"/>
+          <a:stretch>
+            <a:fillRect/>
+          </a:stretch>
+        </p:blipFill>
+        <p:spPr>
+          <a:xfrm>
+            <a:off x="6527412" y="856649"/>
+            <a:ext cx="4362450" cy="314325"/>
+          </a:xfrm>
+          <a:prstGeom prst="rect">
+            <a:avLst/>
+          </a:prstGeom>
+        </p:spPr>
+      </p:pic>
+      <p:pic>
+        <p:nvPicPr>
+          <p:cNvPr id="7" name="Picture 6">
+            <a:extLst>
+              <a:ext uri="{FF2B5EF4-FFF2-40B4-BE49-F238E27FC236}">
+                <a16:creationId xmlns:a16="http://schemas.microsoft.com/office/drawing/2014/main" id="{C8EDA1E9-D392-4771-B6AC-167BAE6C81D8}"/>
+              </a:ext>
+            </a:extLst>
+          </p:cNvPr>
+          <p:cNvPicPr>
+            <a:picLocks noChangeAspect="1"/>
+          </p:cNvPicPr>
+          <p:nvPr/>
+        </p:nvPicPr>
+        <p:blipFill>
+          <a:blip r:embed="rId6"/>
+          <a:stretch>
+            <a:fillRect/>
+          </a:stretch>
+        </p:blipFill>
+        <p:spPr>
+          <a:xfrm>
+            <a:off x="9801537" y="4511901"/>
+            <a:ext cx="2245803" cy="1362208"/>
+          </a:xfrm>
+          <a:prstGeom prst="rect">
+            <a:avLst/>
+          </a:prstGeom>
+        </p:spPr>
+      </p:pic>
+      <p:sp>
+        <p:nvSpPr>
+          <p:cNvPr id="11" name="TextBox 10">
+            <a:extLst>
+              <a:ext uri="{FF2B5EF4-FFF2-40B4-BE49-F238E27FC236}">
+                <a16:creationId xmlns:a16="http://schemas.microsoft.com/office/drawing/2014/main" id="{FD592EBF-F4FA-4127-88AD-67098B7543B0}"/>
+              </a:ext>
+            </a:extLst>
+          </p:cNvPr>
+          <p:cNvSpPr txBox="1"/>
+          <p:nvPr/>
+        </p:nvSpPr>
+        <p:spPr>
+          <a:xfrm>
+            <a:off x="6842834" y="1395159"/>
+            <a:ext cx="2483141" cy="369332"/>
+          </a:xfrm>
+          <a:prstGeom prst="rect">
+            <a:avLst/>
+          </a:prstGeom>
+          <a:noFill/>
+        </p:spPr>
+        <p:txBody>
+          <a:bodyPr wrap="square" rtlCol="0">
+            <a:spAutoFit/>
+          </a:bodyPr>
+          <a:lstStyle/>
+          <a:p>
+            <a:r>
+              <a:rPr lang="en-US" b="1" i="1" dirty="0"/>
+              <a:t>Confusion Matrices</a:t>
+            </a:r>
+          </a:p>
+        </p:txBody>
+      </p:sp>
     </p:spTree>
     <p:extLst>
       <p:ext uri="{BB962C8B-B14F-4D97-AF65-F5344CB8AC3E}">
-        <p14:creationId xmlns:p14="http://schemas.microsoft.com/office/powerpoint/2010/main" val="3280937754"/>
+        <p14:creationId xmlns:p14="http://schemas.microsoft.com/office/powerpoint/2010/main" val="3207630302"/>
       </p:ext>
     </p:extLst>
   </p:cSld>
@@ -9518,7 +9794,7 @@
           <p:cNvPr id="2" name="Title 1">
             <a:extLst>
               <a:ext uri="{FF2B5EF4-FFF2-40B4-BE49-F238E27FC236}">
-                <a16:creationId xmlns:a16="http://schemas.microsoft.com/office/drawing/2014/main" id="{52D48A4B-A168-4481-BA28-E1FACFC36496}"/>
+                <a16:creationId xmlns:a16="http://schemas.microsoft.com/office/drawing/2014/main" id="{A367EC24-0D94-42EB-9DCF-9464002C38F8}"/>
               </a:ext>
             </a:extLst>
           </p:cNvPr>
@@ -9531,8 +9807,8 @@
         </p:nvSpPr>
         <p:spPr>
           <a:xfrm>
-            <a:off x="2408446" y="624111"/>
-            <a:ext cx="4790008" cy="1280890"/>
+            <a:off x="1687669" y="624110"/>
+            <a:ext cx="4137059" cy="1280890"/>
           </a:xfrm>
         </p:spPr>
         <p:txBody>
@@ -9542,10 +9818,10 @@
           <a:lstStyle/>
           <a:p>
             <a:r>
-              <a:rPr lang="en-US" sz="3300" b="1" dirty="0">
+              <a:rPr lang="en-US" sz="3200" b="1">
                 <a:latin typeface="Garamond" panose="02020404030301010803" pitchFamily="18" charset="0"/>
               </a:rPr>
-              <a:t>FINE TUNING AND CONFUSION MATRIX</a:t>
+              <a:t>RANDOMFOREST MODEL</a:t>
             </a:r>
           </a:p>
         </p:txBody>
@@ -9555,7 +9831,7 @@
           <p:cNvPr id="3" name="Content Placeholder 2">
             <a:extLst>
               <a:ext uri="{FF2B5EF4-FFF2-40B4-BE49-F238E27FC236}">
-                <a16:creationId xmlns:a16="http://schemas.microsoft.com/office/drawing/2014/main" id="{C31C2FFA-307E-430A-AF63-AC1EA974EC71}"/>
+                <a16:creationId xmlns:a16="http://schemas.microsoft.com/office/drawing/2014/main" id="{E8305DD0-BF1D-4544-BC71-9A81D54A5BF3}"/>
               </a:ext>
             </a:extLst>
           </p:cNvPr>
@@ -9568,50 +9844,80 @@
         </p:nvSpPr>
         <p:spPr>
           <a:xfrm>
-            <a:off x="2396266" y="2040467"/>
-            <a:ext cx="4802188" cy="3870755"/>
+            <a:off x="1683955" y="1905000"/>
+            <a:ext cx="4140772" cy="4328890"/>
           </a:xfrm>
         </p:spPr>
         <p:txBody>
           <a:bodyPr>
-            <a:normAutofit/>
+            <a:normAutofit lnSpcReduction="10000"/>
           </a:bodyPr>
           <a:lstStyle/>
           <a:p>
             <a:r>
-              <a:rPr lang="en-US" dirty="0"/>
-              <a:t>Freeze(freeze_to) and unfreezing(unfreeze) is helpful in us deciding which specific layers of the model we want to train at a certain point of time in an epoch.</a:t>
+              <a:rPr lang="en-US" dirty="0">
+                <a:solidFill>
+                  <a:srgbClr val="000000"/>
+                </a:solidFill>
+              </a:rPr>
+              <a:t>Hypertuned parameters using GridSearchCV with 5 folds(n_estimators= 50, max_depth=15)</a:t>
+            </a:r>
+          </a:p>
+          <a:p>
+            <a:r>
+              <a:rPr lang="en-US" dirty="0">
+                <a:solidFill>
+                  <a:srgbClr val="000000"/>
+                </a:solidFill>
+              </a:rPr>
+              <a:t>This result is for the original tweets feature, non cleaned.</a:t>
             </a:r>
           </a:p>
           <a:p>
             <a:pPr marL="0" indent="0">
               <a:buNone/>
             </a:pPr>
-            <a:endParaRPr lang="en-US" dirty="0"/>
-          </a:p>
-          <a:p>
-            <a:r>
-              <a:rPr lang="en-US" dirty="0"/>
-              <a:t>Confusion-matrix is a good technique to summarize the performance of a classification algorithm. We use ClassificationInterpretationclass here.</a:t>
-            </a:r>
-          </a:p>
-          <a:p>
-            <a:pPr marL="0" indent="0">
-              <a:buNone/>
-            </a:pPr>
-            <a:endParaRPr lang="en-US" dirty="0"/>
-          </a:p>
-          <a:p>
-            <a:endParaRPr lang="en-US" dirty="0"/>
+            <a:endParaRPr lang="en-US" dirty="0">
+              <a:solidFill>
+                <a:srgbClr val="000000"/>
+              </a:solidFill>
+            </a:endParaRPr>
+          </a:p>
+          <a:p>
+            <a:endParaRPr lang="en-US" dirty="0">
+              <a:solidFill>
+                <a:srgbClr val="000000"/>
+              </a:solidFill>
+            </a:endParaRPr>
+          </a:p>
+          <a:p>
+            <a:r>
+              <a:rPr lang="en-US" dirty="0">
+                <a:solidFill>
+                  <a:srgbClr val="000000"/>
+                </a:solidFill>
+              </a:rPr>
+              <a:t>Hypertuned parameters using GridSearchCV with 5 folds(n_estimators= 50, max_depth=15)</a:t>
+            </a:r>
+          </a:p>
+          <a:p>
+            <a:r>
+              <a:rPr lang="en-US" dirty="0">
+                <a:solidFill>
+                  <a:srgbClr val="000000"/>
+                </a:solidFill>
+              </a:rPr>
+              <a:t>This result is for the cleaned tweets feature.</a:t>
+            </a:r>
           </a:p>
         </p:txBody>
       </p:sp>
       <p:pic>
         <p:nvPicPr>
-          <p:cNvPr id="2050" name="Picture 2" descr="A screenshot of a cell phone&#10;&#10;Description automatically generated">
+          <p:cNvPr id="2050" name="Picture 2">
             <a:extLst>
               <a:ext uri="{FF2B5EF4-FFF2-40B4-BE49-F238E27FC236}">
-                <a16:creationId xmlns:a16="http://schemas.microsoft.com/office/drawing/2014/main" id="{E8ED7083-C91A-4998-B56B-D0807E1896A9}"/>
+                <a16:creationId xmlns:a16="http://schemas.microsoft.com/office/drawing/2014/main" id="{36FD2892-72B8-47EE-8D5B-9987AA6C1628}"/>
               </a:ext>
             </a:extLst>
           </p:cNvPr>
@@ -9620,7 +9926,7 @@
           </p:cNvPicPr>
           <p:nvPr/>
         </p:nvPicPr>
-        <p:blipFill rotWithShape="1">
+        <p:blipFill>
           <a:blip r:embed="rId2">
             <a:extLst>
               <a:ext uri="{28A0092B-C50C-407E-A947-70E740481C1C}">
@@ -9628,13 +9934,14 @@
               </a:ext>
             </a:extLst>
           </a:blip>
-          <a:srcRect l="1072" r="11482"/>
-          <a:stretch/>
+          <a:stretch>
+            <a:fillRect/>
+          </a:stretch>
         </p:blipFill>
         <p:spPr bwMode="auto">
           <a:xfrm>
-            <a:off x="7558675" y="3429000"/>
-            <a:ext cx="3408245" cy="2376182"/>
+            <a:off x="6367274" y="2059196"/>
+            <a:ext cx="2847412" cy="1963215"/>
           </a:xfrm>
           <a:prstGeom prst="rect">
             <a:avLst/>
@@ -9653,10 +9960,10 @@
       </p:pic>
       <p:pic>
         <p:nvPicPr>
-          <p:cNvPr id="2055" name="Picture 7">
+          <p:cNvPr id="2052" name="Picture 4">
             <a:extLst>
               <a:ext uri="{FF2B5EF4-FFF2-40B4-BE49-F238E27FC236}">
-                <a16:creationId xmlns:a16="http://schemas.microsoft.com/office/drawing/2014/main" id="{C5F24615-672D-4FE5-894D-5E96EEC2F525}"/>
+                <a16:creationId xmlns:a16="http://schemas.microsoft.com/office/drawing/2014/main" id="{1BEE3877-BFB4-485C-BEEF-8FACCE1CED31}"/>
               </a:ext>
             </a:extLst>
           </p:cNvPr>
@@ -9680,8 +9987,8 @@
         </p:blipFill>
         <p:spPr bwMode="auto">
           <a:xfrm>
-            <a:off x="7198454" y="504826"/>
-            <a:ext cx="3038475" cy="2800350"/>
+            <a:off x="9404761" y="2299136"/>
+            <a:ext cx="2454546" cy="1432230"/>
           </a:xfrm>
           <a:prstGeom prst="rect">
             <a:avLst/>
@@ -9698,12 +10005,103 @@
           </a:extLst>
         </p:spPr>
       </p:pic>
+      <p:sp>
+        <p:nvSpPr>
+          <p:cNvPr id="4" name="Right Brace 3">
+            <a:extLst>
+              <a:ext uri="{FF2B5EF4-FFF2-40B4-BE49-F238E27FC236}">
+                <a16:creationId xmlns:a16="http://schemas.microsoft.com/office/drawing/2014/main" id="{E6951A23-B5AC-40DA-909F-ED27CFD022CF}"/>
+              </a:ext>
+            </a:extLst>
+          </p:cNvPr>
+          <p:cNvSpPr/>
+          <p:nvPr/>
+        </p:nvSpPr>
+        <p:spPr>
+          <a:xfrm>
+            <a:off x="5402424" y="1905000"/>
+            <a:ext cx="895739" cy="2117411"/>
+          </a:xfrm>
+          <a:prstGeom prst="rightBrace">
+            <a:avLst/>
+          </a:prstGeom>
+        </p:spPr>
+        <p:style>
+          <a:lnRef idx="1">
+            <a:schemeClr val="accent1"/>
+          </a:lnRef>
+          <a:fillRef idx="0">
+            <a:schemeClr val="accent1"/>
+          </a:fillRef>
+          <a:effectRef idx="0">
+            <a:schemeClr val="accent1"/>
+          </a:effectRef>
+          <a:fontRef idx="minor">
+            <a:schemeClr val="tx1"/>
+          </a:fontRef>
+        </p:style>
+        <p:txBody>
+          <a:bodyPr rtlCol="0" anchor="ctr"/>
+          <a:lstStyle/>
+          <a:p>
+            <a:pPr algn="ctr"/>
+            <a:endParaRPr lang="en-US"/>
+          </a:p>
+        </p:txBody>
+      </p:sp>
       <p:pic>
         <p:nvPicPr>
-          <p:cNvPr id="4" name="Picture 3">
+          <p:cNvPr id="2054" name="Picture 6">
             <a:extLst>
               <a:ext uri="{FF2B5EF4-FFF2-40B4-BE49-F238E27FC236}">
-                <a16:creationId xmlns:a16="http://schemas.microsoft.com/office/drawing/2014/main" id="{B539D720-7978-42B7-BC97-AEAF9A8B1BC8}"/>
+                <a16:creationId xmlns:a16="http://schemas.microsoft.com/office/drawing/2014/main" id="{6B6F09C2-CD1C-4637-AAB0-B691ED7232D4}"/>
+              </a:ext>
+            </a:extLst>
+          </p:cNvPr>
+          <p:cNvPicPr>
+            <a:picLocks noChangeAspect="1" noChangeArrowheads="1"/>
+          </p:cNvPicPr>
+          <p:nvPr/>
+        </p:nvPicPr>
+        <p:blipFill>
+          <a:blip r:embed="rId4">
+            <a:extLst>
+              <a:ext uri="{28A0092B-C50C-407E-A947-70E740481C1C}">
+                <a14:useLocalDpi xmlns:a14="http://schemas.microsoft.com/office/drawing/2010/main" val="0"/>
+              </a:ext>
+            </a:extLst>
+          </a:blip>
+          <a:srcRect/>
+          <a:stretch>
+            <a:fillRect/>
+          </a:stretch>
+        </p:blipFill>
+        <p:spPr bwMode="auto">
+          <a:xfrm>
+            <a:off x="6497329" y="4360344"/>
+            <a:ext cx="2717357" cy="1873546"/>
+          </a:xfrm>
+          <a:prstGeom prst="rect">
+            <a:avLst/>
+          </a:prstGeom>
+          <a:noFill/>
+          <a:extLst>
+            <a:ext uri="{909E8E84-426E-40DD-AFC4-6F175D3DCCD1}">
+              <a14:hiddenFill xmlns:a14="http://schemas.microsoft.com/office/drawing/2010/main">
+                <a:solidFill>
+                  <a:srgbClr val="FFFFFF"/>
+                </a:solidFill>
+              </a14:hiddenFill>
+            </a:ext>
+          </a:extLst>
+        </p:spPr>
+      </p:pic>
+      <p:pic>
+        <p:nvPicPr>
+          <p:cNvPr id="5" name="Picture 4">
+            <a:extLst>
+              <a:ext uri="{FF2B5EF4-FFF2-40B4-BE49-F238E27FC236}">
+                <a16:creationId xmlns:a16="http://schemas.microsoft.com/office/drawing/2014/main" id="{345ECA0D-F08B-4EAC-8789-435F4516878B}"/>
               </a:ext>
             </a:extLst>
           </p:cNvPr>
@@ -9713,25 +10111,104 @@
           <p:nvPr/>
         </p:nvPicPr>
         <p:blipFill>
-          <a:blip r:embed="rId4"/>
+          <a:blip r:embed="rId5"/>
           <a:stretch>
             <a:fillRect/>
           </a:stretch>
         </p:blipFill>
         <p:spPr>
           <a:xfrm>
-            <a:off x="2512154" y="5465166"/>
-            <a:ext cx="4686300" cy="371475"/>
+            <a:off x="9404760" y="4450702"/>
+            <a:ext cx="2542128" cy="1488816"/>
           </a:xfrm>
           <a:prstGeom prst="rect">
             <a:avLst/>
           </a:prstGeom>
         </p:spPr>
       </p:pic>
+      <p:sp>
+        <p:nvSpPr>
+          <p:cNvPr id="6" name="Right Brace 5">
+            <a:extLst>
+              <a:ext uri="{FF2B5EF4-FFF2-40B4-BE49-F238E27FC236}">
+                <a16:creationId xmlns:a16="http://schemas.microsoft.com/office/drawing/2014/main" id="{421EB054-8DC5-4190-877A-B7256F952DCF}"/>
+              </a:ext>
+            </a:extLst>
+          </p:cNvPr>
+          <p:cNvSpPr/>
+          <p:nvPr/>
+        </p:nvSpPr>
+        <p:spPr>
+          <a:xfrm>
+            <a:off x="5402424" y="4273420"/>
+            <a:ext cx="895739" cy="1744825"/>
+          </a:xfrm>
+          <a:prstGeom prst="rightBrace">
+            <a:avLst/>
+          </a:prstGeom>
+        </p:spPr>
+        <p:style>
+          <a:lnRef idx="1">
+            <a:schemeClr val="accent1"/>
+          </a:lnRef>
+          <a:fillRef idx="0">
+            <a:schemeClr val="accent1"/>
+          </a:fillRef>
+          <a:effectRef idx="0">
+            <a:schemeClr val="accent1"/>
+          </a:effectRef>
+          <a:fontRef idx="minor">
+            <a:schemeClr val="tx1"/>
+          </a:fontRef>
+        </p:style>
+        <p:txBody>
+          <a:bodyPr rtlCol="0" anchor="ctr"/>
+          <a:lstStyle/>
+          <a:p>
+            <a:pPr algn="ctr"/>
+            <a:endParaRPr lang="en-US"/>
+          </a:p>
+        </p:txBody>
+      </p:sp>
+      <p:sp>
+        <p:nvSpPr>
+          <p:cNvPr id="7" name="TextBox 6">
+            <a:extLst>
+              <a:ext uri="{FF2B5EF4-FFF2-40B4-BE49-F238E27FC236}">
+                <a16:creationId xmlns:a16="http://schemas.microsoft.com/office/drawing/2014/main" id="{A10FE1C3-17A5-48ED-B735-CBA558D85C0D}"/>
+              </a:ext>
+            </a:extLst>
+          </p:cNvPr>
+          <p:cNvSpPr txBox="1"/>
+          <p:nvPr/>
+        </p:nvSpPr>
+        <p:spPr>
+          <a:xfrm>
+            <a:off x="6644081" y="1602297"/>
+            <a:ext cx="2483141" cy="369332"/>
+          </a:xfrm>
+          <a:prstGeom prst="rect">
+            <a:avLst/>
+          </a:prstGeom>
+          <a:noFill/>
+        </p:spPr>
+        <p:txBody>
+          <a:bodyPr wrap="square" rtlCol="0">
+            <a:spAutoFit/>
+          </a:bodyPr>
+          <a:lstStyle/>
+          <a:p>
+            <a:r>
+              <a:rPr lang="en-US" b="1" i="1" dirty="0"/>
+              <a:t>Confusion Matrices</a:t>
+            </a:r>
+          </a:p>
+        </p:txBody>
+      </p:sp>
     </p:spTree>
     <p:extLst>
       <p:ext uri="{BB962C8B-B14F-4D97-AF65-F5344CB8AC3E}">
-        <p14:creationId xmlns:p14="http://schemas.microsoft.com/office/powerpoint/2010/main" val="1755323565"/>
+        <p14:creationId xmlns:p14="http://schemas.microsoft.com/office/powerpoint/2010/main" val="825916813"/>
       </p:ext>
     </p:extLst>
   </p:cSld>
@@ -9789,7 +10266,7 @@
           <p:cNvPr id="2" name="Title 1">
             <a:extLst>
               <a:ext uri="{FF2B5EF4-FFF2-40B4-BE49-F238E27FC236}">
-                <a16:creationId xmlns:a16="http://schemas.microsoft.com/office/drawing/2014/main" id="{332B7FDF-1B2E-4942-9C97-3748AE36ACBA}"/>
+                <a16:creationId xmlns:a16="http://schemas.microsoft.com/office/drawing/2014/main" id="{BC830CEC-C51B-4DE1-9EE6-985693B07FF0}"/>
               </a:ext>
             </a:extLst>
           </p:cNvPr>
@@ -9812,16 +10289,11 @@
           </a:bodyPr>
           <a:lstStyle/>
           <a:p>
-            <a:pPr>
-              <a:lnSpc>
-                <a:spcPct val="90000"/>
-              </a:lnSpc>
-            </a:pPr>
-            <a:r>
-              <a:rPr lang="en-US" sz="2700" b="1">
+            <a:r>
+              <a:rPr lang="en-US" sz="3200" b="1">
                 <a:latin typeface="Garamond" panose="02020404030301010803" pitchFamily="18" charset="0"/>
               </a:rPr>
-              <a:t>LOGISTIC REGRESSION MODEL</a:t>
+              <a:t>SUPPORT VECTOR MACHINE</a:t>
             </a:r>
           </a:p>
         </p:txBody>
@@ -9831,7 +10303,7 @@
           <p:cNvPr id="3" name="Content Placeholder 2">
             <a:extLst>
               <a:ext uri="{FF2B5EF4-FFF2-40B4-BE49-F238E27FC236}">
-                <a16:creationId xmlns:a16="http://schemas.microsoft.com/office/drawing/2014/main" id="{0FBF52AF-46F1-4417-A90D-F79B7138A5A2}"/>
+                <a16:creationId xmlns:a16="http://schemas.microsoft.com/office/drawing/2014/main" id="{0CE813B1-49AF-4831-837C-9CD0B4F4A57B}"/>
               </a:ext>
             </a:extLst>
           </p:cNvPr>
@@ -9844,13 +10316,13 @@
         </p:nvSpPr>
         <p:spPr>
           <a:xfrm>
-            <a:off x="1683956" y="1811144"/>
-            <a:ext cx="4096059" cy="4422745"/>
+            <a:off x="1683956" y="2133600"/>
+            <a:ext cx="4140772" cy="4100290"/>
           </a:xfrm>
         </p:spPr>
         <p:txBody>
           <a:bodyPr>
-            <a:normAutofit fontScale="92500" lnSpcReduction="20000"/>
+            <a:normAutofit fontScale="92500" lnSpcReduction="10000"/>
           </a:bodyPr>
           <a:lstStyle/>
           <a:p>
@@ -9860,7 +10332,15 @@
                   <a:srgbClr val="000000"/>
                 </a:solidFill>
               </a:rPr>
-              <a:t>Optimized Parameters using GridSearchCV using 5 folds (penalty = 'l1', C= 0.1)</a:t>
+              <a:t>Optimized parameters with GridSearchCV 5 folds(</a:t>
+            </a:r>
+            <a:r>
+              <a:rPr lang="it-IT" dirty="0">
+                <a:solidFill>
+                  <a:srgbClr val="000000"/>
+                </a:solidFill>
+              </a:rPr>
+              <a:t>C=1,gamma='scale', kernel='linear’)</a:t>
             </a:r>
           </a:p>
           <a:p>
@@ -9870,7 +10350,7 @@
                   <a:srgbClr val="000000"/>
                 </a:solidFill>
               </a:rPr>
-              <a:t>This result is for the original tweets(non cleaned version of text and description combined)</a:t>
+              <a:t>This result is for the original tweets feature, non cleaned.</a:t>
             </a:r>
           </a:p>
           <a:p>
@@ -9879,40 +10359,6 @@
                 <a:srgbClr val="000000"/>
               </a:solidFill>
             </a:endParaRPr>
-          </a:p>
-          <a:p>
-            <a:endParaRPr lang="en-US" dirty="0">
-              <a:solidFill>
-                <a:srgbClr val="000000"/>
-              </a:solidFill>
-            </a:endParaRPr>
-          </a:p>
-          <a:p>
-            <a:endParaRPr lang="en-US" dirty="0">
-              <a:solidFill>
-                <a:srgbClr val="000000"/>
-              </a:solidFill>
-            </a:endParaRPr>
-          </a:p>
-          <a:p>
-            <a:r>
-              <a:rPr lang="en-US" dirty="0">
-                <a:solidFill>
-                  <a:srgbClr val="000000"/>
-                </a:solidFill>
-              </a:rPr>
-              <a:t>Optimized Parameters using GridSearchCV using 5 folds (penalty = 'l1', C= 0.1)</a:t>
-            </a:r>
-          </a:p>
-          <a:p>
-            <a:r>
-              <a:rPr lang="en-US" dirty="0">
-                <a:solidFill>
-                  <a:srgbClr val="000000"/>
-                </a:solidFill>
-              </a:rPr>
-              <a:t>This result is for the cleaned tweets(using process of Lemmatization, tokenization, stop words)</a:t>
-            </a:r>
           </a:p>
           <a:p>
             <a:pPr marL="0" indent="0">
@@ -9924,14 +10370,59 @@
               </a:solidFill>
             </a:endParaRPr>
           </a:p>
+          <a:p>
+            <a:r>
+              <a:rPr lang="en-US" dirty="0">
+                <a:solidFill>
+                  <a:srgbClr val="000000"/>
+                </a:solidFill>
+              </a:rPr>
+              <a:t>Optimized parameters with GridSearchCV 5 folds(</a:t>
+            </a:r>
+            <a:r>
+              <a:rPr lang="it-IT" dirty="0">
+                <a:solidFill>
+                  <a:srgbClr val="000000"/>
+                </a:solidFill>
+              </a:rPr>
+              <a:t>C=1,gamma='scale', kernel='linear’)</a:t>
+            </a:r>
+          </a:p>
+          <a:p>
+            <a:r>
+              <a:rPr lang="en-US" dirty="0">
+                <a:solidFill>
+                  <a:srgbClr val="000000"/>
+                </a:solidFill>
+              </a:rPr>
+              <a:t>This result is for the cleaned tweets feature, </a:t>
+            </a:r>
+          </a:p>
+          <a:p>
+            <a:endParaRPr lang="it-IT" dirty="0">
+              <a:solidFill>
+                <a:srgbClr val="000000"/>
+              </a:solidFill>
+            </a:endParaRPr>
+          </a:p>
+          <a:p>
+            <a:pPr marL="0" indent="0">
+              <a:buNone/>
+            </a:pPr>
+            <a:endParaRPr lang="en-US" dirty="0">
+              <a:solidFill>
+                <a:srgbClr val="000000"/>
+              </a:solidFill>
+            </a:endParaRPr>
+          </a:p>
         </p:txBody>
       </p:sp>
       <p:pic>
         <p:nvPicPr>
-          <p:cNvPr id="1026" name="Picture 2">
+          <p:cNvPr id="3074" name="Picture 2">
             <a:extLst>
               <a:ext uri="{FF2B5EF4-FFF2-40B4-BE49-F238E27FC236}">
-                <a16:creationId xmlns:a16="http://schemas.microsoft.com/office/drawing/2014/main" id="{A4A8BA8F-7EAA-4FA0-B97D-4E7098284D4E}"/>
+                <a16:creationId xmlns:a16="http://schemas.microsoft.com/office/drawing/2014/main" id="{94CE636C-528A-41F1-B970-C9F48F5270C3}"/>
               </a:ext>
             </a:extLst>
           </p:cNvPr>
@@ -9954,8 +10445,8 @@
         </p:blipFill>
         <p:spPr bwMode="auto">
           <a:xfrm>
-            <a:off x="6367274" y="1720814"/>
-            <a:ext cx="3434263" cy="2367834"/>
+            <a:off x="6204126" y="2065124"/>
+            <a:ext cx="2838813" cy="1957287"/>
           </a:xfrm>
           <a:prstGeom prst="rect">
             <a:avLst/>
@@ -9974,10 +10465,10 @@
       </p:pic>
       <p:pic>
         <p:nvPicPr>
-          <p:cNvPr id="1028" name="Picture 4">
+          <p:cNvPr id="3076" name="Picture 4">
             <a:extLst>
               <a:ext uri="{FF2B5EF4-FFF2-40B4-BE49-F238E27FC236}">
-                <a16:creationId xmlns:a16="http://schemas.microsoft.com/office/drawing/2014/main" id="{18257F34-5191-48AD-BE65-A929F0A438D4}"/>
+                <a16:creationId xmlns:a16="http://schemas.microsoft.com/office/drawing/2014/main" id="{E08CAAD3-0E09-4184-A47C-F5EEBE0FF5CF}"/>
               </a:ext>
             </a:extLst>
           </p:cNvPr>
@@ -10001,8 +10492,8 @@
         </p:blipFill>
         <p:spPr bwMode="auto">
           <a:xfrm>
-            <a:off x="9801537" y="2154346"/>
-            <a:ext cx="2176651" cy="1274654"/>
+            <a:off x="9232096" y="2276858"/>
+            <a:ext cx="2551896" cy="1533817"/>
           </a:xfrm>
           <a:prstGeom prst="rect">
             <a:avLst/>
@@ -10024,7 +10515,7 @@
           <p:cNvPr id="4" name="Right Brace 3">
             <a:extLst>
               <a:ext uri="{FF2B5EF4-FFF2-40B4-BE49-F238E27FC236}">
-                <a16:creationId xmlns:a16="http://schemas.microsoft.com/office/drawing/2014/main" id="{FC0A15F3-EF98-4061-9BE2-0D635650D2E3}"/>
+                <a16:creationId xmlns:a16="http://schemas.microsoft.com/office/drawing/2014/main" id="{2F46C6BF-FA5D-4162-B442-995F083AAFF7}"/>
               </a:ext>
             </a:extLst>
           </p:cNvPr>
@@ -10033,8 +10524,8 @@
         </p:nvSpPr>
         <p:spPr>
           <a:xfrm>
-            <a:off x="5503178" y="1644242"/>
-            <a:ext cx="864096" cy="2265028"/>
+            <a:off x="5225143" y="2065124"/>
+            <a:ext cx="788742" cy="1957287"/>
           </a:xfrm>
           <a:prstGeom prst="rightBrace">
             <a:avLst/>
@@ -10065,10 +10556,10 @@
       </p:sp>
       <p:pic>
         <p:nvPicPr>
-          <p:cNvPr id="1030" name="Picture 6">
+          <p:cNvPr id="3078" name="Picture 6">
             <a:extLst>
               <a:ext uri="{FF2B5EF4-FFF2-40B4-BE49-F238E27FC236}">
-                <a16:creationId xmlns:a16="http://schemas.microsoft.com/office/drawing/2014/main" id="{48B919C5-C0BB-4472-95D5-499A52F3BCDA}"/>
+                <a16:creationId xmlns:a16="http://schemas.microsoft.com/office/drawing/2014/main" id="{54CB7A1C-86AD-4ABF-B285-59CFAF483A35}"/>
               </a:ext>
             </a:extLst>
           </p:cNvPr>
@@ -10092,8 +10583,8 @@
         </p:blipFill>
         <p:spPr bwMode="auto">
           <a:xfrm>
-            <a:off x="6513032" y="4245429"/>
-            <a:ext cx="3288505" cy="2267338"/>
+            <a:off x="6204124" y="4566949"/>
+            <a:ext cx="2838815" cy="1957288"/>
           </a:xfrm>
           <a:prstGeom prst="rect">
             <a:avLst/>
@@ -10110,56 +10601,12 @@
           </a:extLst>
         </p:spPr>
       </p:pic>
-      <p:sp>
-        <p:nvSpPr>
-          <p:cNvPr id="5" name="Right Brace 4">
+      <p:pic>
+        <p:nvPicPr>
+          <p:cNvPr id="5" name="Picture 4">
             <a:extLst>
               <a:ext uri="{FF2B5EF4-FFF2-40B4-BE49-F238E27FC236}">
-                <a16:creationId xmlns:a16="http://schemas.microsoft.com/office/drawing/2014/main" id="{72F64266-154C-42B2-9521-46E7877FE893}"/>
-              </a:ext>
-            </a:extLst>
-          </p:cNvPr>
-          <p:cNvSpPr/>
-          <p:nvPr/>
-        </p:nvSpPr>
-        <p:spPr>
-          <a:xfrm>
-            <a:off x="5503178" y="4152122"/>
-            <a:ext cx="864096" cy="2081767"/>
-          </a:xfrm>
-          <a:prstGeom prst="rightBrace">
-            <a:avLst/>
-          </a:prstGeom>
-        </p:spPr>
-        <p:style>
-          <a:lnRef idx="1">
-            <a:schemeClr val="accent1"/>
-          </a:lnRef>
-          <a:fillRef idx="0">
-            <a:schemeClr val="accent1"/>
-          </a:fillRef>
-          <a:effectRef idx="0">
-            <a:schemeClr val="accent1"/>
-          </a:effectRef>
-          <a:fontRef idx="minor">
-            <a:schemeClr val="tx1"/>
-          </a:fontRef>
-        </p:style>
-        <p:txBody>
-          <a:bodyPr rtlCol="0" anchor="ctr"/>
-          <a:lstStyle/>
-          <a:p>
-            <a:pPr algn="ctr"/>
-            <a:endParaRPr lang="en-US"/>
-          </a:p>
-        </p:txBody>
-      </p:sp>
-      <p:pic>
-        <p:nvPicPr>
-          <p:cNvPr id="6" name="Picture 5">
-            <a:extLst>
-              <a:ext uri="{FF2B5EF4-FFF2-40B4-BE49-F238E27FC236}">
-                <a16:creationId xmlns:a16="http://schemas.microsoft.com/office/drawing/2014/main" id="{05AD3C33-D6ED-4A2C-B66A-53338F5D73A0}"/>
+                <a16:creationId xmlns:a16="http://schemas.microsoft.com/office/drawing/2014/main" id="{3632365D-4F54-43FB-B644-57B11D6FADBE}"/>
               </a:ext>
             </a:extLst>
           </p:cNvPr>
@@ -10176,50 +10623,64 @@
         </p:blipFill>
         <p:spPr>
           <a:xfrm>
-            <a:off x="6527412" y="856649"/>
-            <a:ext cx="4362450" cy="314325"/>
+            <a:off x="9243201" y="4700073"/>
+            <a:ext cx="2607489" cy="1533817"/>
           </a:xfrm>
           <a:prstGeom prst="rect">
             <a:avLst/>
           </a:prstGeom>
         </p:spPr>
       </p:pic>
-      <p:pic>
-        <p:nvPicPr>
-          <p:cNvPr id="7" name="Picture 6">
+      <p:sp>
+        <p:nvSpPr>
+          <p:cNvPr id="6" name="Right Brace 5">
             <a:extLst>
               <a:ext uri="{FF2B5EF4-FFF2-40B4-BE49-F238E27FC236}">
-                <a16:creationId xmlns:a16="http://schemas.microsoft.com/office/drawing/2014/main" id="{C8EDA1E9-D392-4771-B6AC-167BAE6C81D8}"/>
+                <a16:creationId xmlns:a16="http://schemas.microsoft.com/office/drawing/2014/main" id="{007E48FE-2513-4B41-B80B-32E7A3E578C0}"/>
               </a:ext>
             </a:extLst>
           </p:cNvPr>
-          <p:cNvPicPr>
-            <a:picLocks noChangeAspect="1"/>
-          </p:cNvPicPr>
+          <p:cNvSpPr/>
           <p:nvPr/>
-        </p:nvPicPr>
-        <p:blipFill>
-          <a:blip r:embed="rId6"/>
-          <a:stretch>
-            <a:fillRect/>
-          </a:stretch>
-        </p:blipFill>
+        </p:nvSpPr>
         <p:spPr>
           <a:xfrm>
-            <a:off x="9801537" y="4511901"/>
-            <a:ext cx="2245803" cy="1362208"/>
-          </a:xfrm>
-          <a:prstGeom prst="rect">
+            <a:off x="5449078" y="4366727"/>
+            <a:ext cx="646922" cy="2024742"/>
+          </a:xfrm>
+          <a:prstGeom prst="rightBrace">
             <a:avLst/>
           </a:prstGeom>
         </p:spPr>
-      </p:pic>
-      <p:sp>
-        <p:nvSpPr>
-          <p:cNvPr id="11" name="TextBox 10">
+        <p:style>
+          <a:lnRef idx="1">
+            <a:schemeClr val="accent1"/>
+          </a:lnRef>
+          <a:fillRef idx="0">
+            <a:schemeClr val="accent1"/>
+          </a:fillRef>
+          <a:effectRef idx="0">
+            <a:schemeClr val="accent1"/>
+          </a:effectRef>
+          <a:fontRef idx="minor">
+            <a:schemeClr val="tx1"/>
+          </a:fontRef>
+        </p:style>
+        <p:txBody>
+          <a:bodyPr rtlCol="0" anchor="ctr"/>
+          <a:lstStyle/>
+          <a:p>
+            <a:pPr algn="ctr"/>
+            <a:endParaRPr lang="en-US"/>
+          </a:p>
+        </p:txBody>
+      </p:sp>
+      <p:sp>
+        <p:nvSpPr>
+          <p:cNvPr id="10" name="TextBox 9">
             <a:extLst>
               <a:ext uri="{FF2B5EF4-FFF2-40B4-BE49-F238E27FC236}">
-                <a16:creationId xmlns:a16="http://schemas.microsoft.com/office/drawing/2014/main" id="{FD592EBF-F4FA-4127-88AD-67098B7543B0}"/>
+                <a16:creationId xmlns:a16="http://schemas.microsoft.com/office/drawing/2014/main" id="{B3D4A20C-AD0F-4D2D-BD30-19E1E01A3AA3}"/>
               </a:ext>
             </a:extLst>
           </p:cNvPr>
@@ -10228,7 +10689,7 @@
         </p:nvSpPr>
         <p:spPr>
           <a:xfrm>
-            <a:off x="6842834" y="1395159"/>
+            <a:off x="6644081" y="1602297"/>
             <a:ext cx="2483141" cy="369332"/>
           </a:xfrm>
           <a:prstGeom prst="rect">
@@ -10252,7 +10713,7 @@
     </p:spTree>
     <p:extLst>
       <p:ext uri="{BB962C8B-B14F-4D97-AF65-F5344CB8AC3E}">
-        <p14:creationId xmlns:p14="http://schemas.microsoft.com/office/powerpoint/2010/main" val="3207630302"/>
+        <p14:creationId xmlns:p14="http://schemas.microsoft.com/office/powerpoint/2010/main" val="2029681287"/>
       </p:ext>
     </p:extLst>
   </p:cSld>
@@ -10310,983 +10771,6 @@
           <p:cNvPr id="2" name="Title 1">
             <a:extLst>
               <a:ext uri="{FF2B5EF4-FFF2-40B4-BE49-F238E27FC236}">
-                <a16:creationId xmlns:a16="http://schemas.microsoft.com/office/drawing/2014/main" id="{A367EC24-0D94-42EB-9DCF-9464002C38F8}"/>
-              </a:ext>
-            </a:extLst>
-          </p:cNvPr>
-          <p:cNvSpPr>
-            <a:spLocks noGrp="1"/>
-          </p:cNvSpPr>
-          <p:nvPr>
-            <p:ph type="title"/>
-          </p:nvPr>
-        </p:nvSpPr>
-        <p:spPr>
-          <a:xfrm>
-            <a:off x="1687669" y="624110"/>
-            <a:ext cx="4137059" cy="1280890"/>
-          </a:xfrm>
-        </p:spPr>
-        <p:txBody>
-          <a:bodyPr>
-            <a:normAutofit/>
-          </a:bodyPr>
-          <a:lstStyle/>
-          <a:p>
-            <a:r>
-              <a:rPr lang="en-US" sz="3200" b="1">
-                <a:latin typeface="Garamond" panose="02020404030301010803" pitchFamily="18" charset="0"/>
-              </a:rPr>
-              <a:t>RANDOMFOREST MODEL</a:t>
-            </a:r>
-          </a:p>
-        </p:txBody>
-      </p:sp>
-      <p:sp>
-        <p:nvSpPr>
-          <p:cNvPr id="3" name="Content Placeholder 2">
-            <a:extLst>
-              <a:ext uri="{FF2B5EF4-FFF2-40B4-BE49-F238E27FC236}">
-                <a16:creationId xmlns:a16="http://schemas.microsoft.com/office/drawing/2014/main" id="{E8305DD0-BF1D-4544-BC71-9A81D54A5BF3}"/>
-              </a:ext>
-            </a:extLst>
-          </p:cNvPr>
-          <p:cNvSpPr>
-            <a:spLocks noGrp="1"/>
-          </p:cNvSpPr>
-          <p:nvPr>
-            <p:ph idx="1"/>
-          </p:nvPr>
-        </p:nvSpPr>
-        <p:spPr>
-          <a:xfrm>
-            <a:off x="1683955" y="1905000"/>
-            <a:ext cx="4140772" cy="4328890"/>
-          </a:xfrm>
-        </p:spPr>
-        <p:txBody>
-          <a:bodyPr>
-            <a:normAutofit lnSpcReduction="10000"/>
-          </a:bodyPr>
-          <a:lstStyle/>
-          <a:p>
-            <a:r>
-              <a:rPr lang="en-US" dirty="0">
-                <a:solidFill>
-                  <a:srgbClr val="000000"/>
-                </a:solidFill>
-              </a:rPr>
-              <a:t>Hypertuned parameters using GridSearchCV with 5 folds(n_estimators= 50, max_depth=15)</a:t>
-            </a:r>
-          </a:p>
-          <a:p>
-            <a:r>
-              <a:rPr lang="en-US" dirty="0">
-                <a:solidFill>
-                  <a:srgbClr val="000000"/>
-                </a:solidFill>
-              </a:rPr>
-              <a:t>This result is for the original tweets feature, non cleaned.</a:t>
-            </a:r>
-          </a:p>
-          <a:p>
-            <a:pPr marL="0" indent="0">
-              <a:buNone/>
-            </a:pPr>
-            <a:endParaRPr lang="en-US" dirty="0">
-              <a:solidFill>
-                <a:srgbClr val="000000"/>
-              </a:solidFill>
-            </a:endParaRPr>
-          </a:p>
-          <a:p>
-            <a:endParaRPr lang="en-US" dirty="0">
-              <a:solidFill>
-                <a:srgbClr val="000000"/>
-              </a:solidFill>
-            </a:endParaRPr>
-          </a:p>
-          <a:p>
-            <a:r>
-              <a:rPr lang="en-US" dirty="0">
-                <a:solidFill>
-                  <a:srgbClr val="000000"/>
-                </a:solidFill>
-              </a:rPr>
-              <a:t>Hypertuned parameters using GridSearchCV with 5 folds(n_estimators= 50, max_depth=15)</a:t>
-            </a:r>
-          </a:p>
-          <a:p>
-            <a:r>
-              <a:rPr lang="en-US" dirty="0">
-                <a:solidFill>
-                  <a:srgbClr val="000000"/>
-                </a:solidFill>
-              </a:rPr>
-              <a:t>This result is for the cleaned tweets feature.</a:t>
-            </a:r>
-          </a:p>
-        </p:txBody>
-      </p:sp>
-      <p:pic>
-        <p:nvPicPr>
-          <p:cNvPr id="2050" name="Picture 2">
-            <a:extLst>
-              <a:ext uri="{FF2B5EF4-FFF2-40B4-BE49-F238E27FC236}">
-                <a16:creationId xmlns:a16="http://schemas.microsoft.com/office/drawing/2014/main" id="{36FD2892-72B8-47EE-8D5B-9987AA6C1628}"/>
-              </a:ext>
-            </a:extLst>
-          </p:cNvPr>
-          <p:cNvPicPr>
-            <a:picLocks noChangeAspect="1" noChangeArrowheads="1"/>
-          </p:cNvPicPr>
-          <p:nvPr/>
-        </p:nvPicPr>
-        <p:blipFill>
-          <a:blip r:embed="rId2">
-            <a:extLst>
-              <a:ext uri="{28A0092B-C50C-407E-A947-70E740481C1C}">
-                <a14:useLocalDpi xmlns:a14="http://schemas.microsoft.com/office/drawing/2010/main" val="0"/>
-              </a:ext>
-            </a:extLst>
-          </a:blip>
-          <a:stretch>
-            <a:fillRect/>
-          </a:stretch>
-        </p:blipFill>
-        <p:spPr bwMode="auto">
-          <a:xfrm>
-            <a:off x="6367274" y="2059196"/>
-            <a:ext cx="2847412" cy="1963215"/>
-          </a:xfrm>
-          <a:prstGeom prst="rect">
-            <a:avLst/>
-          </a:prstGeom>
-          <a:noFill/>
-          <a:extLst>
-            <a:ext uri="{909E8E84-426E-40DD-AFC4-6F175D3DCCD1}">
-              <a14:hiddenFill xmlns:a14="http://schemas.microsoft.com/office/drawing/2010/main">
-                <a:solidFill>
-                  <a:srgbClr val="FFFFFF"/>
-                </a:solidFill>
-              </a14:hiddenFill>
-            </a:ext>
-          </a:extLst>
-        </p:spPr>
-      </p:pic>
-      <p:pic>
-        <p:nvPicPr>
-          <p:cNvPr id="2052" name="Picture 4">
-            <a:extLst>
-              <a:ext uri="{FF2B5EF4-FFF2-40B4-BE49-F238E27FC236}">
-                <a16:creationId xmlns:a16="http://schemas.microsoft.com/office/drawing/2014/main" id="{1BEE3877-BFB4-485C-BEEF-8FACCE1CED31}"/>
-              </a:ext>
-            </a:extLst>
-          </p:cNvPr>
-          <p:cNvPicPr>
-            <a:picLocks noChangeAspect="1" noChangeArrowheads="1"/>
-          </p:cNvPicPr>
-          <p:nvPr/>
-        </p:nvPicPr>
-        <p:blipFill>
-          <a:blip r:embed="rId3">
-            <a:extLst>
-              <a:ext uri="{28A0092B-C50C-407E-A947-70E740481C1C}">
-                <a14:useLocalDpi xmlns:a14="http://schemas.microsoft.com/office/drawing/2010/main" val="0"/>
-              </a:ext>
-            </a:extLst>
-          </a:blip>
-          <a:srcRect/>
-          <a:stretch>
-            <a:fillRect/>
-          </a:stretch>
-        </p:blipFill>
-        <p:spPr bwMode="auto">
-          <a:xfrm>
-            <a:off x="9404761" y="2299136"/>
-            <a:ext cx="2454546" cy="1432230"/>
-          </a:xfrm>
-          <a:prstGeom prst="rect">
-            <a:avLst/>
-          </a:prstGeom>
-          <a:noFill/>
-          <a:extLst>
-            <a:ext uri="{909E8E84-426E-40DD-AFC4-6F175D3DCCD1}">
-              <a14:hiddenFill xmlns:a14="http://schemas.microsoft.com/office/drawing/2010/main">
-                <a:solidFill>
-                  <a:srgbClr val="FFFFFF"/>
-                </a:solidFill>
-              </a14:hiddenFill>
-            </a:ext>
-          </a:extLst>
-        </p:spPr>
-      </p:pic>
-      <p:sp>
-        <p:nvSpPr>
-          <p:cNvPr id="4" name="Right Brace 3">
-            <a:extLst>
-              <a:ext uri="{FF2B5EF4-FFF2-40B4-BE49-F238E27FC236}">
-                <a16:creationId xmlns:a16="http://schemas.microsoft.com/office/drawing/2014/main" id="{E6951A23-B5AC-40DA-909F-ED27CFD022CF}"/>
-              </a:ext>
-            </a:extLst>
-          </p:cNvPr>
-          <p:cNvSpPr/>
-          <p:nvPr/>
-        </p:nvSpPr>
-        <p:spPr>
-          <a:xfrm>
-            <a:off x="5402424" y="1905000"/>
-            <a:ext cx="895739" cy="2117411"/>
-          </a:xfrm>
-          <a:prstGeom prst="rightBrace">
-            <a:avLst/>
-          </a:prstGeom>
-        </p:spPr>
-        <p:style>
-          <a:lnRef idx="1">
-            <a:schemeClr val="accent1"/>
-          </a:lnRef>
-          <a:fillRef idx="0">
-            <a:schemeClr val="accent1"/>
-          </a:fillRef>
-          <a:effectRef idx="0">
-            <a:schemeClr val="accent1"/>
-          </a:effectRef>
-          <a:fontRef idx="minor">
-            <a:schemeClr val="tx1"/>
-          </a:fontRef>
-        </p:style>
-        <p:txBody>
-          <a:bodyPr rtlCol="0" anchor="ctr"/>
-          <a:lstStyle/>
-          <a:p>
-            <a:pPr algn="ctr"/>
-            <a:endParaRPr lang="en-US"/>
-          </a:p>
-        </p:txBody>
-      </p:sp>
-      <p:pic>
-        <p:nvPicPr>
-          <p:cNvPr id="2054" name="Picture 6">
-            <a:extLst>
-              <a:ext uri="{FF2B5EF4-FFF2-40B4-BE49-F238E27FC236}">
-                <a16:creationId xmlns:a16="http://schemas.microsoft.com/office/drawing/2014/main" id="{6B6F09C2-CD1C-4637-AAB0-B691ED7232D4}"/>
-              </a:ext>
-            </a:extLst>
-          </p:cNvPr>
-          <p:cNvPicPr>
-            <a:picLocks noChangeAspect="1" noChangeArrowheads="1"/>
-          </p:cNvPicPr>
-          <p:nvPr/>
-        </p:nvPicPr>
-        <p:blipFill>
-          <a:blip r:embed="rId4">
-            <a:extLst>
-              <a:ext uri="{28A0092B-C50C-407E-A947-70E740481C1C}">
-                <a14:useLocalDpi xmlns:a14="http://schemas.microsoft.com/office/drawing/2010/main" val="0"/>
-              </a:ext>
-            </a:extLst>
-          </a:blip>
-          <a:srcRect/>
-          <a:stretch>
-            <a:fillRect/>
-          </a:stretch>
-        </p:blipFill>
-        <p:spPr bwMode="auto">
-          <a:xfrm>
-            <a:off x="6497329" y="4360344"/>
-            <a:ext cx="2717357" cy="1873546"/>
-          </a:xfrm>
-          <a:prstGeom prst="rect">
-            <a:avLst/>
-          </a:prstGeom>
-          <a:noFill/>
-          <a:extLst>
-            <a:ext uri="{909E8E84-426E-40DD-AFC4-6F175D3DCCD1}">
-              <a14:hiddenFill xmlns:a14="http://schemas.microsoft.com/office/drawing/2010/main">
-                <a:solidFill>
-                  <a:srgbClr val="FFFFFF"/>
-                </a:solidFill>
-              </a14:hiddenFill>
-            </a:ext>
-          </a:extLst>
-        </p:spPr>
-      </p:pic>
-      <p:pic>
-        <p:nvPicPr>
-          <p:cNvPr id="5" name="Picture 4">
-            <a:extLst>
-              <a:ext uri="{FF2B5EF4-FFF2-40B4-BE49-F238E27FC236}">
-                <a16:creationId xmlns:a16="http://schemas.microsoft.com/office/drawing/2014/main" id="{345ECA0D-F08B-4EAC-8789-435F4516878B}"/>
-              </a:ext>
-            </a:extLst>
-          </p:cNvPr>
-          <p:cNvPicPr>
-            <a:picLocks noChangeAspect="1"/>
-          </p:cNvPicPr>
-          <p:nvPr/>
-        </p:nvPicPr>
-        <p:blipFill>
-          <a:blip r:embed="rId5"/>
-          <a:stretch>
-            <a:fillRect/>
-          </a:stretch>
-        </p:blipFill>
-        <p:spPr>
-          <a:xfrm>
-            <a:off x="9404760" y="4450702"/>
-            <a:ext cx="2542128" cy="1488816"/>
-          </a:xfrm>
-          <a:prstGeom prst="rect">
-            <a:avLst/>
-          </a:prstGeom>
-        </p:spPr>
-      </p:pic>
-      <p:sp>
-        <p:nvSpPr>
-          <p:cNvPr id="6" name="Right Brace 5">
-            <a:extLst>
-              <a:ext uri="{FF2B5EF4-FFF2-40B4-BE49-F238E27FC236}">
-                <a16:creationId xmlns:a16="http://schemas.microsoft.com/office/drawing/2014/main" id="{421EB054-8DC5-4190-877A-B7256F952DCF}"/>
-              </a:ext>
-            </a:extLst>
-          </p:cNvPr>
-          <p:cNvSpPr/>
-          <p:nvPr/>
-        </p:nvSpPr>
-        <p:spPr>
-          <a:xfrm>
-            <a:off x="5402424" y="4273420"/>
-            <a:ext cx="895739" cy="1744825"/>
-          </a:xfrm>
-          <a:prstGeom prst="rightBrace">
-            <a:avLst/>
-          </a:prstGeom>
-        </p:spPr>
-        <p:style>
-          <a:lnRef idx="1">
-            <a:schemeClr val="accent1"/>
-          </a:lnRef>
-          <a:fillRef idx="0">
-            <a:schemeClr val="accent1"/>
-          </a:fillRef>
-          <a:effectRef idx="0">
-            <a:schemeClr val="accent1"/>
-          </a:effectRef>
-          <a:fontRef idx="minor">
-            <a:schemeClr val="tx1"/>
-          </a:fontRef>
-        </p:style>
-        <p:txBody>
-          <a:bodyPr rtlCol="0" anchor="ctr"/>
-          <a:lstStyle/>
-          <a:p>
-            <a:pPr algn="ctr"/>
-            <a:endParaRPr lang="en-US"/>
-          </a:p>
-        </p:txBody>
-      </p:sp>
-      <p:sp>
-        <p:nvSpPr>
-          <p:cNvPr id="7" name="TextBox 6">
-            <a:extLst>
-              <a:ext uri="{FF2B5EF4-FFF2-40B4-BE49-F238E27FC236}">
-                <a16:creationId xmlns:a16="http://schemas.microsoft.com/office/drawing/2014/main" id="{A10FE1C3-17A5-48ED-B735-CBA558D85C0D}"/>
-              </a:ext>
-            </a:extLst>
-          </p:cNvPr>
-          <p:cNvSpPr txBox="1"/>
-          <p:nvPr/>
-        </p:nvSpPr>
-        <p:spPr>
-          <a:xfrm>
-            <a:off x="6644081" y="1602297"/>
-            <a:ext cx="2483141" cy="369332"/>
-          </a:xfrm>
-          <a:prstGeom prst="rect">
-            <a:avLst/>
-          </a:prstGeom>
-          <a:noFill/>
-        </p:spPr>
-        <p:txBody>
-          <a:bodyPr wrap="square" rtlCol="0">
-            <a:spAutoFit/>
-          </a:bodyPr>
-          <a:lstStyle/>
-          <a:p>
-            <a:r>
-              <a:rPr lang="en-US" b="1" i="1" dirty="0"/>
-              <a:t>Confusion Matrices</a:t>
-            </a:r>
-          </a:p>
-        </p:txBody>
-      </p:sp>
-    </p:spTree>
-    <p:extLst>
-      <p:ext uri="{BB962C8B-B14F-4D97-AF65-F5344CB8AC3E}">
-        <p14:creationId xmlns:p14="http://schemas.microsoft.com/office/powerpoint/2010/main" val="825916813"/>
-      </p:ext>
-    </p:extLst>
-  </p:cSld>
-  <p:clrMapOvr>
-    <a:masterClrMapping/>
-  </p:clrMapOvr>
-</p:sld>
-</file>
-
-<file path=ppt/slides/slide14.xml><?xml version="1.0" encoding="utf-8"?>
-<p:sld xmlns:a="http://schemas.openxmlformats.org/drawingml/2006/main" xmlns:r="http://schemas.openxmlformats.org/officeDocument/2006/relationships" xmlns:p="http://schemas.openxmlformats.org/presentationml/2006/main">
-  <p:cSld>
-    <p:bg>
-      <p:bgPr>
-        <a:gradFill rotWithShape="1">
-          <a:gsLst>
-            <a:gs pos="0">
-              <a:schemeClr val="bg2">
-                <a:tint val="90000"/>
-                <a:satMod val="92000"/>
-                <a:lumMod val="120000"/>
-              </a:schemeClr>
-            </a:gs>
-            <a:gs pos="100000">
-              <a:schemeClr val="bg2">
-                <a:shade val="98000"/>
-                <a:satMod val="120000"/>
-                <a:lumMod val="98000"/>
-              </a:schemeClr>
-            </a:gs>
-          </a:gsLst>
-          <a:path path="circle">
-            <a:fillToRect l="50000" t="50000" r="100000" b="100000"/>
-          </a:path>
-        </a:gradFill>
-        <a:effectLst/>
-      </p:bgPr>
-    </p:bg>
-    <p:spTree>
-      <p:nvGrpSpPr>
-        <p:cNvPr id="1" name=""/>
-        <p:cNvGrpSpPr/>
-        <p:nvPr/>
-      </p:nvGrpSpPr>
-      <p:grpSpPr>
-        <a:xfrm>
-          <a:off x="0" y="0"/>
-          <a:ext cx="0" cy="0"/>
-          <a:chOff x="0" y="0"/>
-          <a:chExt cx="0" cy="0"/>
-        </a:xfrm>
-      </p:grpSpPr>
-      <p:sp>
-        <p:nvSpPr>
-          <p:cNvPr id="2" name="Title 1">
-            <a:extLst>
-              <a:ext uri="{FF2B5EF4-FFF2-40B4-BE49-F238E27FC236}">
-                <a16:creationId xmlns:a16="http://schemas.microsoft.com/office/drawing/2014/main" id="{BC830CEC-C51B-4DE1-9EE6-985693B07FF0}"/>
-              </a:ext>
-            </a:extLst>
-          </p:cNvPr>
-          <p:cNvSpPr>
-            <a:spLocks noGrp="1"/>
-          </p:cNvSpPr>
-          <p:nvPr>
-            <p:ph type="title"/>
-          </p:nvPr>
-        </p:nvSpPr>
-        <p:spPr>
-          <a:xfrm>
-            <a:off x="1687669" y="624110"/>
-            <a:ext cx="4137059" cy="1280890"/>
-          </a:xfrm>
-        </p:spPr>
-        <p:txBody>
-          <a:bodyPr>
-            <a:normAutofit/>
-          </a:bodyPr>
-          <a:lstStyle/>
-          <a:p>
-            <a:r>
-              <a:rPr lang="en-US" sz="3200" b="1">
-                <a:latin typeface="Garamond" panose="02020404030301010803" pitchFamily="18" charset="0"/>
-              </a:rPr>
-              <a:t>SUPPORT VECTOR MACHINE</a:t>
-            </a:r>
-          </a:p>
-        </p:txBody>
-      </p:sp>
-      <p:sp>
-        <p:nvSpPr>
-          <p:cNvPr id="3" name="Content Placeholder 2">
-            <a:extLst>
-              <a:ext uri="{FF2B5EF4-FFF2-40B4-BE49-F238E27FC236}">
-                <a16:creationId xmlns:a16="http://schemas.microsoft.com/office/drawing/2014/main" id="{0CE813B1-49AF-4831-837C-9CD0B4F4A57B}"/>
-              </a:ext>
-            </a:extLst>
-          </p:cNvPr>
-          <p:cNvSpPr>
-            <a:spLocks noGrp="1"/>
-          </p:cNvSpPr>
-          <p:nvPr>
-            <p:ph idx="1"/>
-          </p:nvPr>
-        </p:nvSpPr>
-        <p:spPr>
-          <a:xfrm>
-            <a:off x="1683956" y="2133600"/>
-            <a:ext cx="4140772" cy="4100290"/>
-          </a:xfrm>
-        </p:spPr>
-        <p:txBody>
-          <a:bodyPr>
-            <a:normAutofit fontScale="92500" lnSpcReduction="10000"/>
-          </a:bodyPr>
-          <a:lstStyle/>
-          <a:p>
-            <a:r>
-              <a:rPr lang="en-US" dirty="0">
-                <a:solidFill>
-                  <a:srgbClr val="000000"/>
-                </a:solidFill>
-              </a:rPr>
-              <a:t>Optimized parameters with GridSearchCV 5 folds(</a:t>
-            </a:r>
-            <a:r>
-              <a:rPr lang="it-IT" dirty="0">
-                <a:solidFill>
-                  <a:srgbClr val="000000"/>
-                </a:solidFill>
-              </a:rPr>
-              <a:t>C=1,gamma='scale', kernel='linear’)</a:t>
-            </a:r>
-          </a:p>
-          <a:p>
-            <a:r>
-              <a:rPr lang="en-US" dirty="0">
-                <a:solidFill>
-                  <a:srgbClr val="000000"/>
-                </a:solidFill>
-              </a:rPr>
-              <a:t>This result is for the original tweets feature, non cleaned.</a:t>
-            </a:r>
-          </a:p>
-          <a:p>
-            <a:endParaRPr lang="en-US" dirty="0">
-              <a:solidFill>
-                <a:srgbClr val="000000"/>
-              </a:solidFill>
-            </a:endParaRPr>
-          </a:p>
-          <a:p>
-            <a:pPr marL="0" indent="0">
-              <a:buNone/>
-            </a:pPr>
-            <a:endParaRPr lang="en-US" dirty="0">
-              <a:solidFill>
-                <a:srgbClr val="000000"/>
-              </a:solidFill>
-            </a:endParaRPr>
-          </a:p>
-          <a:p>
-            <a:r>
-              <a:rPr lang="en-US" dirty="0">
-                <a:solidFill>
-                  <a:srgbClr val="000000"/>
-                </a:solidFill>
-              </a:rPr>
-              <a:t>Optimized parameters with GridSearchCV 5 folds(</a:t>
-            </a:r>
-            <a:r>
-              <a:rPr lang="it-IT" dirty="0">
-                <a:solidFill>
-                  <a:srgbClr val="000000"/>
-                </a:solidFill>
-              </a:rPr>
-              <a:t>C=1,gamma='scale', kernel='linear’)</a:t>
-            </a:r>
-          </a:p>
-          <a:p>
-            <a:r>
-              <a:rPr lang="en-US" dirty="0">
-                <a:solidFill>
-                  <a:srgbClr val="000000"/>
-                </a:solidFill>
-              </a:rPr>
-              <a:t>This result is for the cleaned tweets feature, </a:t>
-            </a:r>
-          </a:p>
-          <a:p>
-            <a:endParaRPr lang="it-IT" dirty="0">
-              <a:solidFill>
-                <a:srgbClr val="000000"/>
-              </a:solidFill>
-            </a:endParaRPr>
-          </a:p>
-          <a:p>
-            <a:pPr marL="0" indent="0">
-              <a:buNone/>
-            </a:pPr>
-            <a:endParaRPr lang="en-US" dirty="0">
-              <a:solidFill>
-                <a:srgbClr val="000000"/>
-              </a:solidFill>
-            </a:endParaRPr>
-          </a:p>
-        </p:txBody>
-      </p:sp>
-      <p:pic>
-        <p:nvPicPr>
-          <p:cNvPr id="3074" name="Picture 2">
-            <a:extLst>
-              <a:ext uri="{FF2B5EF4-FFF2-40B4-BE49-F238E27FC236}">
-                <a16:creationId xmlns:a16="http://schemas.microsoft.com/office/drawing/2014/main" id="{94CE636C-528A-41F1-B970-C9F48F5270C3}"/>
-              </a:ext>
-            </a:extLst>
-          </p:cNvPr>
-          <p:cNvPicPr>
-            <a:picLocks noChangeAspect="1" noChangeArrowheads="1"/>
-          </p:cNvPicPr>
-          <p:nvPr/>
-        </p:nvPicPr>
-        <p:blipFill>
-          <a:blip r:embed="rId2">
-            <a:extLst>
-              <a:ext uri="{28A0092B-C50C-407E-A947-70E740481C1C}">
-                <a14:useLocalDpi xmlns:a14="http://schemas.microsoft.com/office/drawing/2010/main" val="0"/>
-              </a:ext>
-            </a:extLst>
-          </a:blip>
-          <a:stretch>
-            <a:fillRect/>
-          </a:stretch>
-        </p:blipFill>
-        <p:spPr bwMode="auto">
-          <a:xfrm>
-            <a:off x="6204126" y="2065124"/>
-            <a:ext cx="2838813" cy="1957287"/>
-          </a:xfrm>
-          <a:prstGeom prst="rect">
-            <a:avLst/>
-          </a:prstGeom>
-          <a:noFill/>
-          <a:extLst>
-            <a:ext uri="{909E8E84-426E-40DD-AFC4-6F175D3DCCD1}">
-              <a14:hiddenFill xmlns:a14="http://schemas.microsoft.com/office/drawing/2010/main">
-                <a:solidFill>
-                  <a:srgbClr val="FFFFFF"/>
-                </a:solidFill>
-              </a14:hiddenFill>
-            </a:ext>
-          </a:extLst>
-        </p:spPr>
-      </p:pic>
-      <p:pic>
-        <p:nvPicPr>
-          <p:cNvPr id="3076" name="Picture 4">
-            <a:extLst>
-              <a:ext uri="{FF2B5EF4-FFF2-40B4-BE49-F238E27FC236}">
-                <a16:creationId xmlns:a16="http://schemas.microsoft.com/office/drawing/2014/main" id="{E08CAAD3-0E09-4184-A47C-F5EEBE0FF5CF}"/>
-              </a:ext>
-            </a:extLst>
-          </p:cNvPr>
-          <p:cNvPicPr>
-            <a:picLocks noChangeAspect="1" noChangeArrowheads="1"/>
-          </p:cNvPicPr>
-          <p:nvPr/>
-        </p:nvPicPr>
-        <p:blipFill>
-          <a:blip r:embed="rId3">
-            <a:extLst>
-              <a:ext uri="{28A0092B-C50C-407E-A947-70E740481C1C}">
-                <a14:useLocalDpi xmlns:a14="http://schemas.microsoft.com/office/drawing/2010/main" val="0"/>
-              </a:ext>
-            </a:extLst>
-          </a:blip>
-          <a:srcRect/>
-          <a:stretch>
-            <a:fillRect/>
-          </a:stretch>
-        </p:blipFill>
-        <p:spPr bwMode="auto">
-          <a:xfrm>
-            <a:off x="9232096" y="2276858"/>
-            <a:ext cx="2551896" cy="1533817"/>
-          </a:xfrm>
-          <a:prstGeom prst="rect">
-            <a:avLst/>
-          </a:prstGeom>
-          <a:noFill/>
-          <a:extLst>
-            <a:ext uri="{909E8E84-426E-40DD-AFC4-6F175D3DCCD1}">
-              <a14:hiddenFill xmlns:a14="http://schemas.microsoft.com/office/drawing/2010/main">
-                <a:solidFill>
-                  <a:srgbClr val="FFFFFF"/>
-                </a:solidFill>
-              </a14:hiddenFill>
-            </a:ext>
-          </a:extLst>
-        </p:spPr>
-      </p:pic>
-      <p:sp>
-        <p:nvSpPr>
-          <p:cNvPr id="4" name="Right Brace 3">
-            <a:extLst>
-              <a:ext uri="{FF2B5EF4-FFF2-40B4-BE49-F238E27FC236}">
-                <a16:creationId xmlns:a16="http://schemas.microsoft.com/office/drawing/2014/main" id="{2F46C6BF-FA5D-4162-B442-995F083AAFF7}"/>
-              </a:ext>
-            </a:extLst>
-          </p:cNvPr>
-          <p:cNvSpPr/>
-          <p:nvPr/>
-        </p:nvSpPr>
-        <p:spPr>
-          <a:xfrm>
-            <a:off x="5225143" y="2065124"/>
-            <a:ext cx="788742" cy="1957287"/>
-          </a:xfrm>
-          <a:prstGeom prst="rightBrace">
-            <a:avLst/>
-          </a:prstGeom>
-        </p:spPr>
-        <p:style>
-          <a:lnRef idx="1">
-            <a:schemeClr val="accent1"/>
-          </a:lnRef>
-          <a:fillRef idx="0">
-            <a:schemeClr val="accent1"/>
-          </a:fillRef>
-          <a:effectRef idx="0">
-            <a:schemeClr val="accent1"/>
-          </a:effectRef>
-          <a:fontRef idx="minor">
-            <a:schemeClr val="tx1"/>
-          </a:fontRef>
-        </p:style>
-        <p:txBody>
-          <a:bodyPr rtlCol="0" anchor="ctr"/>
-          <a:lstStyle/>
-          <a:p>
-            <a:pPr algn="ctr"/>
-            <a:endParaRPr lang="en-US"/>
-          </a:p>
-        </p:txBody>
-      </p:sp>
-      <p:pic>
-        <p:nvPicPr>
-          <p:cNvPr id="3078" name="Picture 6">
-            <a:extLst>
-              <a:ext uri="{FF2B5EF4-FFF2-40B4-BE49-F238E27FC236}">
-                <a16:creationId xmlns:a16="http://schemas.microsoft.com/office/drawing/2014/main" id="{54CB7A1C-86AD-4ABF-B285-59CFAF483A35}"/>
-              </a:ext>
-            </a:extLst>
-          </p:cNvPr>
-          <p:cNvPicPr>
-            <a:picLocks noChangeAspect="1" noChangeArrowheads="1"/>
-          </p:cNvPicPr>
-          <p:nvPr/>
-        </p:nvPicPr>
-        <p:blipFill>
-          <a:blip r:embed="rId4">
-            <a:extLst>
-              <a:ext uri="{28A0092B-C50C-407E-A947-70E740481C1C}">
-                <a14:useLocalDpi xmlns:a14="http://schemas.microsoft.com/office/drawing/2010/main" val="0"/>
-              </a:ext>
-            </a:extLst>
-          </a:blip>
-          <a:srcRect/>
-          <a:stretch>
-            <a:fillRect/>
-          </a:stretch>
-        </p:blipFill>
-        <p:spPr bwMode="auto">
-          <a:xfrm>
-            <a:off x="6204124" y="4566949"/>
-            <a:ext cx="2838815" cy="1957288"/>
-          </a:xfrm>
-          <a:prstGeom prst="rect">
-            <a:avLst/>
-          </a:prstGeom>
-          <a:noFill/>
-          <a:extLst>
-            <a:ext uri="{909E8E84-426E-40DD-AFC4-6F175D3DCCD1}">
-              <a14:hiddenFill xmlns:a14="http://schemas.microsoft.com/office/drawing/2010/main">
-                <a:solidFill>
-                  <a:srgbClr val="FFFFFF"/>
-                </a:solidFill>
-              </a14:hiddenFill>
-            </a:ext>
-          </a:extLst>
-        </p:spPr>
-      </p:pic>
-      <p:pic>
-        <p:nvPicPr>
-          <p:cNvPr id="5" name="Picture 4">
-            <a:extLst>
-              <a:ext uri="{FF2B5EF4-FFF2-40B4-BE49-F238E27FC236}">
-                <a16:creationId xmlns:a16="http://schemas.microsoft.com/office/drawing/2014/main" id="{3632365D-4F54-43FB-B644-57B11D6FADBE}"/>
-              </a:ext>
-            </a:extLst>
-          </p:cNvPr>
-          <p:cNvPicPr>
-            <a:picLocks noChangeAspect="1"/>
-          </p:cNvPicPr>
-          <p:nvPr/>
-        </p:nvPicPr>
-        <p:blipFill>
-          <a:blip r:embed="rId5"/>
-          <a:stretch>
-            <a:fillRect/>
-          </a:stretch>
-        </p:blipFill>
-        <p:spPr>
-          <a:xfrm>
-            <a:off x="9243201" y="4700073"/>
-            <a:ext cx="2607489" cy="1533817"/>
-          </a:xfrm>
-          <a:prstGeom prst="rect">
-            <a:avLst/>
-          </a:prstGeom>
-        </p:spPr>
-      </p:pic>
-      <p:sp>
-        <p:nvSpPr>
-          <p:cNvPr id="6" name="Right Brace 5">
-            <a:extLst>
-              <a:ext uri="{FF2B5EF4-FFF2-40B4-BE49-F238E27FC236}">
-                <a16:creationId xmlns:a16="http://schemas.microsoft.com/office/drawing/2014/main" id="{007E48FE-2513-4B41-B80B-32E7A3E578C0}"/>
-              </a:ext>
-            </a:extLst>
-          </p:cNvPr>
-          <p:cNvSpPr/>
-          <p:nvPr/>
-        </p:nvSpPr>
-        <p:spPr>
-          <a:xfrm>
-            <a:off x="5449078" y="4366727"/>
-            <a:ext cx="646922" cy="2024742"/>
-          </a:xfrm>
-          <a:prstGeom prst="rightBrace">
-            <a:avLst/>
-          </a:prstGeom>
-        </p:spPr>
-        <p:style>
-          <a:lnRef idx="1">
-            <a:schemeClr val="accent1"/>
-          </a:lnRef>
-          <a:fillRef idx="0">
-            <a:schemeClr val="accent1"/>
-          </a:fillRef>
-          <a:effectRef idx="0">
-            <a:schemeClr val="accent1"/>
-          </a:effectRef>
-          <a:fontRef idx="minor">
-            <a:schemeClr val="tx1"/>
-          </a:fontRef>
-        </p:style>
-        <p:txBody>
-          <a:bodyPr rtlCol="0" anchor="ctr"/>
-          <a:lstStyle/>
-          <a:p>
-            <a:pPr algn="ctr"/>
-            <a:endParaRPr lang="en-US"/>
-          </a:p>
-        </p:txBody>
-      </p:sp>
-      <p:sp>
-        <p:nvSpPr>
-          <p:cNvPr id="10" name="TextBox 9">
-            <a:extLst>
-              <a:ext uri="{FF2B5EF4-FFF2-40B4-BE49-F238E27FC236}">
-                <a16:creationId xmlns:a16="http://schemas.microsoft.com/office/drawing/2014/main" id="{B3D4A20C-AD0F-4D2D-BD30-19E1E01A3AA3}"/>
-              </a:ext>
-            </a:extLst>
-          </p:cNvPr>
-          <p:cNvSpPr txBox="1"/>
-          <p:nvPr/>
-        </p:nvSpPr>
-        <p:spPr>
-          <a:xfrm>
-            <a:off x="6644081" y="1602297"/>
-            <a:ext cx="2483141" cy="369332"/>
-          </a:xfrm>
-          <a:prstGeom prst="rect">
-            <a:avLst/>
-          </a:prstGeom>
-          <a:noFill/>
-        </p:spPr>
-        <p:txBody>
-          <a:bodyPr wrap="square" rtlCol="0">
-            <a:spAutoFit/>
-          </a:bodyPr>
-          <a:lstStyle/>
-          <a:p>
-            <a:r>
-              <a:rPr lang="en-US" b="1" i="1" dirty="0"/>
-              <a:t>Confusion Matrices</a:t>
-            </a:r>
-          </a:p>
-        </p:txBody>
-      </p:sp>
-    </p:spTree>
-    <p:extLst>
-      <p:ext uri="{BB962C8B-B14F-4D97-AF65-F5344CB8AC3E}">
-        <p14:creationId xmlns:p14="http://schemas.microsoft.com/office/powerpoint/2010/main" val="2029681287"/>
-      </p:ext>
-    </p:extLst>
-  </p:cSld>
-  <p:clrMapOvr>
-    <a:masterClrMapping/>
-  </p:clrMapOvr>
-</p:sld>
-</file>
-
-<file path=ppt/slides/slide15.xml><?xml version="1.0" encoding="utf-8"?>
-<p:sld xmlns:a="http://schemas.openxmlformats.org/drawingml/2006/main" xmlns:r="http://schemas.openxmlformats.org/officeDocument/2006/relationships" xmlns:p="http://schemas.openxmlformats.org/presentationml/2006/main">
-  <p:cSld>
-    <p:bg>
-      <p:bgPr>
-        <a:gradFill rotWithShape="1">
-          <a:gsLst>
-            <a:gs pos="0">
-              <a:schemeClr val="bg2">
-                <a:tint val="90000"/>
-                <a:satMod val="92000"/>
-                <a:lumMod val="120000"/>
-              </a:schemeClr>
-            </a:gs>
-            <a:gs pos="100000">
-              <a:schemeClr val="bg2">
-                <a:shade val="98000"/>
-                <a:satMod val="120000"/>
-                <a:lumMod val="98000"/>
-              </a:schemeClr>
-            </a:gs>
-          </a:gsLst>
-          <a:path path="circle">
-            <a:fillToRect l="50000" t="50000" r="100000" b="100000"/>
-          </a:path>
-        </a:gradFill>
-        <a:effectLst/>
-      </p:bgPr>
-    </p:bg>
-    <p:spTree>
-      <p:nvGrpSpPr>
-        <p:cNvPr id="1" name=""/>
-        <p:cNvGrpSpPr/>
-        <p:nvPr/>
-      </p:nvGrpSpPr>
-      <p:grpSpPr>
-        <a:xfrm>
-          <a:off x="0" y="0"/>
-          <a:ext cx="0" cy="0"/>
-          <a:chOff x="0" y="0"/>
-          <a:chExt cx="0" cy="0"/>
-        </a:xfrm>
-      </p:grpSpPr>
-      <p:sp>
-        <p:nvSpPr>
-          <p:cNvPr id="2" name="Title 1">
-            <a:extLst>
-              <a:ext uri="{FF2B5EF4-FFF2-40B4-BE49-F238E27FC236}">
                 <a16:creationId xmlns:a16="http://schemas.microsoft.com/office/drawing/2014/main" id="{19AA0796-7294-4C7E-88F1-7D7D9D68F84E}"/>
               </a:ext>
             </a:extLst>
@@ -11849,6 +11333,470 @@
     <p:extLst>
       <p:ext uri="{BB962C8B-B14F-4D97-AF65-F5344CB8AC3E}">
         <p14:creationId xmlns:p14="http://schemas.microsoft.com/office/powerpoint/2010/main" val="3620899645"/>
+      </p:ext>
+    </p:extLst>
+  </p:cSld>
+  <p:clrMapOvr>
+    <a:masterClrMapping/>
+  </p:clrMapOvr>
+</p:sld>
+</file>
+
+<file path=ppt/slides/slide14.xml><?xml version="1.0" encoding="utf-8"?>
+<p:sld xmlns:a="http://schemas.openxmlformats.org/drawingml/2006/main" xmlns:r="http://schemas.openxmlformats.org/officeDocument/2006/relationships" xmlns:p="http://schemas.openxmlformats.org/presentationml/2006/main">
+  <p:cSld>
+    <p:spTree>
+      <p:nvGrpSpPr>
+        <p:cNvPr id="1" name=""/>
+        <p:cNvGrpSpPr/>
+        <p:nvPr/>
+      </p:nvGrpSpPr>
+      <p:grpSpPr>
+        <a:xfrm>
+          <a:off x="0" y="0"/>
+          <a:ext cx="0" cy="0"/>
+          <a:chOff x="0" y="0"/>
+          <a:chExt cx="0" cy="0"/>
+        </a:xfrm>
+      </p:grpSpPr>
+      <p:sp>
+        <p:nvSpPr>
+          <p:cNvPr id="2" name="Title 1">
+            <a:extLst>
+              <a:ext uri="{FF2B5EF4-FFF2-40B4-BE49-F238E27FC236}">
+                <a16:creationId xmlns:a16="http://schemas.microsoft.com/office/drawing/2014/main" id="{986FCF57-4250-4C61-A156-6697F58E851A}"/>
+              </a:ext>
+            </a:extLst>
+          </p:cNvPr>
+          <p:cNvSpPr>
+            <a:spLocks noGrp="1"/>
+          </p:cNvSpPr>
+          <p:nvPr>
+            <p:ph type="title"/>
+          </p:nvPr>
+        </p:nvSpPr>
+        <p:spPr>
+          <a:xfrm>
+            <a:off x="1687669" y="624110"/>
+            <a:ext cx="4217053" cy="1280890"/>
+          </a:xfrm>
+        </p:spPr>
+        <p:txBody>
+          <a:bodyPr>
+            <a:noAutofit/>
+          </a:bodyPr>
+          <a:lstStyle/>
+          <a:p>
+            <a:pPr>
+              <a:lnSpc>
+                <a:spcPct val="90000"/>
+              </a:lnSpc>
+            </a:pPr>
+            <a:r>
+              <a:rPr lang="en-US" sz="2400" b="1" dirty="0">
+                <a:latin typeface="Garamond" panose="02020404030301010803" pitchFamily="18" charset="0"/>
+              </a:rPr>
+              <a:t>USING FASTAI FOR PREDICTIVE MODELLING (TRANSFER LEARNING) </a:t>
+            </a:r>
+          </a:p>
+        </p:txBody>
+      </p:sp>
+      <p:sp>
+        <p:nvSpPr>
+          <p:cNvPr id="3" name="Content Placeholder 2">
+            <a:extLst>
+              <a:ext uri="{FF2B5EF4-FFF2-40B4-BE49-F238E27FC236}">
+                <a16:creationId xmlns:a16="http://schemas.microsoft.com/office/drawing/2014/main" id="{5757FEE5-89AF-4D79-BA9B-9074DB570FEC}"/>
+              </a:ext>
+            </a:extLst>
+          </p:cNvPr>
+          <p:cNvSpPr>
+            <a:spLocks noGrp="1"/>
+          </p:cNvSpPr>
+          <p:nvPr>
+            <p:ph idx="1"/>
+          </p:nvPr>
+        </p:nvSpPr>
+        <p:spPr>
+          <a:xfrm>
+            <a:off x="1687669" y="2121376"/>
+            <a:ext cx="4141673" cy="4112514"/>
+          </a:xfrm>
+        </p:spPr>
+        <p:txBody>
+          <a:bodyPr>
+            <a:normAutofit lnSpcReduction="10000"/>
+          </a:bodyPr>
+          <a:lstStyle/>
+          <a:p>
+            <a:r>
+              <a:rPr lang="en-US" dirty="0"/>
+              <a:t>Transfer learning is a machine learning method where a model developed for a task is reused as the starting point for a model on a second task.</a:t>
+            </a:r>
+          </a:p>
+          <a:p>
+            <a:r>
+              <a:rPr lang="en-US" dirty="0"/>
+              <a:t>Used Google Colab notebooks since it’s on cloud as has GPU as runtime. </a:t>
+            </a:r>
+          </a:p>
+          <a:p>
+            <a:r>
+              <a:rPr lang="en-US" dirty="0"/>
+              <a:t>TextLMDataBunch used to get the data ready for a language model</a:t>
+            </a:r>
+          </a:p>
+          <a:p>
+            <a:r>
+              <a:rPr lang="en-US" dirty="0"/>
+              <a:t>TextClasDataBunch used to get the data ready for a text classifier</a:t>
+            </a:r>
+          </a:p>
+        </p:txBody>
+      </p:sp>
+      <p:pic>
+        <p:nvPicPr>
+          <p:cNvPr id="1032" name="Picture 8">
+            <a:extLst>
+              <a:ext uri="{FF2B5EF4-FFF2-40B4-BE49-F238E27FC236}">
+                <a16:creationId xmlns:a16="http://schemas.microsoft.com/office/drawing/2014/main" id="{3E04472B-9819-4F88-B311-FFC5C509F94A}"/>
+              </a:ext>
+            </a:extLst>
+          </p:cNvPr>
+          <p:cNvPicPr>
+            <a:picLocks noChangeAspect="1" noChangeArrowheads="1"/>
+          </p:cNvPicPr>
+          <p:nvPr/>
+        </p:nvPicPr>
+        <p:blipFill>
+          <a:blip r:embed="rId2">
+            <a:extLst>
+              <a:ext uri="{28A0092B-C50C-407E-A947-70E740481C1C}">
+                <a14:useLocalDpi xmlns:a14="http://schemas.microsoft.com/office/drawing/2010/main" val="0"/>
+              </a:ext>
+            </a:extLst>
+          </a:blip>
+          <a:srcRect/>
+          <a:stretch>
+            <a:fillRect/>
+          </a:stretch>
+        </p:blipFill>
+        <p:spPr bwMode="auto">
+          <a:xfrm>
+            <a:off x="5904722" y="2121376"/>
+            <a:ext cx="5943600" cy="1019175"/>
+          </a:xfrm>
+          <a:prstGeom prst="rect">
+            <a:avLst/>
+          </a:prstGeom>
+          <a:noFill/>
+          <a:extLst>
+            <a:ext uri="{909E8E84-426E-40DD-AFC4-6F175D3DCCD1}">
+              <a14:hiddenFill xmlns:a14="http://schemas.microsoft.com/office/drawing/2010/main">
+                <a:solidFill>
+                  <a:srgbClr val="FFFFFF"/>
+                </a:solidFill>
+              </a14:hiddenFill>
+            </a:ext>
+          </a:extLst>
+        </p:spPr>
+      </p:pic>
+      <p:pic>
+        <p:nvPicPr>
+          <p:cNvPr id="1034" name="Picture 10">
+            <a:extLst>
+              <a:ext uri="{FF2B5EF4-FFF2-40B4-BE49-F238E27FC236}">
+                <a16:creationId xmlns:a16="http://schemas.microsoft.com/office/drawing/2014/main" id="{254DEA3B-0DA2-4CFB-90F9-2411E7691446}"/>
+              </a:ext>
+            </a:extLst>
+          </p:cNvPr>
+          <p:cNvPicPr>
+            <a:picLocks noChangeAspect="1" noChangeArrowheads="1"/>
+          </p:cNvPicPr>
+          <p:nvPr/>
+        </p:nvPicPr>
+        <p:blipFill>
+          <a:blip r:embed="rId3">
+            <a:extLst>
+              <a:ext uri="{28A0092B-C50C-407E-A947-70E740481C1C}">
+                <a14:useLocalDpi xmlns:a14="http://schemas.microsoft.com/office/drawing/2010/main" val="0"/>
+              </a:ext>
+            </a:extLst>
+          </a:blip>
+          <a:srcRect/>
+          <a:stretch>
+            <a:fillRect/>
+          </a:stretch>
+        </p:blipFill>
+        <p:spPr bwMode="auto">
+          <a:xfrm>
+            <a:off x="5904722" y="4094001"/>
+            <a:ext cx="6143625" cy="666750"/>
+          </a:xfrm>
+          <a:prstGeom prst="rect">
+            <a:avLst/>
+          </a:prstGeom>
+          <a:noFill/>
+          <a:extLst>
+            <a:ext uri="{909E8E84-426E-40DD-AFC4-6F175D3DCCD1}">
+              <a14:hiddenFill xmlns:a14="http://schemas.microsoft.com/office/drawing/2010/main">
+                <a:solidFill>
+                  <a:srgbClr val="FFFFFF"/>
+                </a:solidFill>
+              </a14:hiddenFill>
+            </a:ext>
+          </a:extLst>
+        </p:spPr>
+      </p:pic>
+    </p:spTree>
+    <p:extLst>
+      <p:ext uri="{BB962C8B-B14F-4D97-AF65-F5344CB8AC3E}">
+        <p14:creationId xmlns:p14="http://schemas.microsoft.com/office/powerpoint/2010/main" val="3137801528"/>
+      </p:ext>
+    </p:extLst>
+  </p:cSld>
+  <p:clrMapOvr>
+    <a:masterClrMapping/>
+  </p:clrMapOvr>
+</p:sld>
+</file>
+
+<file path=ppt/slides/slide15.xml><?xml version="1.0" encoding="utf-8"?>
+<p:sld xmlns:a="http://schemas.openxmlformats.org/drawingml/2006/main" xmlns:r="http://schemas.openxmlformats.org/officeDocument/2006/relationships" xmlns:p="http://schemas.openxmlformats.org/presentationml/2006/main">
+  <p:cSld>
+    <p:spTree>
+      <p:nvGrpSpPr>
+        <p:cNvPr id="1" name=""/>
+        <p:cNvGrpSpPr/>
+        <p:nvPr/>
+      </p:nvGrpSpPr>
+      <p:grpSpPr>
+        <a:xfrm>
+          <a:off x="0" y="0"/>
+          <a:ext cx="0" cy="0"/>
+          <a:chOff x="0" y="0"/>
+          <a:chExt cx="0" cy="0"/>
+        </a:xfrm>
+      </p:grpSpPr>
+      <p:sp>
+        <p:nvSpPr>
+          <p:cNvPr id="2" name="Title 1">
+            <a:extLst>
+              <a:ext uri="{FF2B5EF4-FFF2-40B4-BE49-F238E27FC236}">
+                <a16:creationId xmlns:a16="http://schemas.microsoft.com/office/drawing/2014/main" id="{52D48A4B-A168-4481-BA28-E1FACFC36496}"/>
+              </a:ext>
+            </a:extLst>
+          </p:cNvPr>
+          <p:cNvSpPr>
+            <a:spLocks noGrp="1"/>
+          </p:cNvSpPr>
+          <p:nvPr>
+            <p:ph type="title"/>
+          </p:nvPr>
+        </p:nvSpPr>
+        <p:spPr>
+          <a:xfrm>
+            <a:off x="2408446" y="624111"/>
+            <a:ext cx="4790008" cy="1280890"/>
+          </a:xfrm>
+        </p:spPr>
+        <p:txBody>
+          <a:bodyPr>
+            <a:normAutofit/>
+          </a:bodyPr>
+          <a:lstStyle/>
+          <a:p>
+            <a:r>
+              <a:rPr lang="en-US" sz="3300" b="1" dirty="0">
+                <a:latin typeface="Garamond" panose="02020404030301010803" pitchFamily="18" charset="0"/>
+              </a:rPr>
+              <a:t>FINE TUNING AND CONFUSION MATRIX</a:t>
+            </a:r>
+          </a:p>
+        </p:txBody>
+      </p:sp>
+      <p:sp>
+        <p:nvSpPr>
+          <p:cNvPr id="3" name="Content Placeholder 2">
+            <a:extLst>
+              <a:ext uri="{FF2B5EF4-FFF2-40B4-BE49-F238E27FC236}">
+                <a16:creationId xmlns:a16="http://schemas.microsoft.com/office/drawing/2014/main" id="{C31C2FFA-307E-430A-AF63-AC1EA974EC71}"/>
+              </a:ext>
+            </a:extLst>
+          </p:cNvPr>
+          <p:cNvSpPr>
+            <a:spLocks noGrp="1"/>
+          </p:cNvSpPr>
+          <p:nvPr>
+            <p:ph idx="1"/>
+          </p:nvPr>
+        </p:nvSpPr>
+        <p:spPr>
+          <a:xfrm>
+            <a:off x="2396266" y="2040467"/>
+            <a:ext cx="4802188" cy="3870755"/>
+          </a:xfrm>
+        </p:spPr>
+        <p:txBody>
+          <a:bodyPr>
+            <a:normAutofit/>
+          </a:bodyPr>
+          <a:lstStyle/>
+          <a:p>
+            <a:r>
+              <a:rPr lang="en-US" dirty="0"/>
+              <a:t>Freeze(freeze_to) and unfreezing(unfreeze) is helpful in us deciding which specific layers of the model we want to train at a certain point of time in an epoch.</a:t>
+            </a:r>
+          </a:p>
+          <a:p>
+            <a:pPr marL="0" indent="0">
+              <a:buNone/>
+            </a:pPr>
+            <a:endParaRPr lang="en-US" dirty="0"/>
+          </a:p>
+          <a:p>
+            <a:r>
+              <a:rPr lang="en-US" dirty="0"/>
+              <a:t>Confusion-matrix is a good technique to summarize the performance of a classification algorithm. We use ClassificationInterpretationclass here.</a:t>
+            </a:r>
+          </a:p>
+          <a:p>
+            <a:pPr marL="0" indent="0">
+              <a:buNone/>
+            </a:pPr>
+            <a:endParaRPr lang="en-US" dirty="0"/>
+          </a:p>
+          <a:p>
+            <a:endParaRPr lang="en-US" dirty="0"/>
+          </a:p>
+        </p:txBody>
+      </p:sp>
+      <p:pic>
+        <p:nvPicPr>
+          <p:cNvPr id="2050" name="Picture 2" descr="A screenshot of a cell phone&#10;&#10;Description automatically generated">
+            <a:extLst>
+              <a:ext uri="{FF2B5EF4-FFF2-40B4-BE49-F238E27FC236}">
+                <a16:creationId xmlns:a16="http://schemas.microsoft.com/office/drawing/2014/main" id="{E8ED7083-C91A-4998-B56B-D0807E1896A9}"/>
+              </a:ext>
+            </a:extLst>
+          </p:cNvPr>
+          <p:cNvPicPr>
+            <a:picLocks noChangeAspect="1" noChangeArrowheads="1"/>
+          </p:cNvPicPr>
+          <p:nvPr/>
+        </p:nvPicPr>
+        <p:blipFill rotWithShape="1">
+          <a:blip r:embed="rId2">
+            <a:extLst>
+              <a:ext uri="{28A0092B-C50C-407E-A947-70E740481C1C}">
+                <a14:useLocalDpi xmlns:a14="http://schemas.microsoft.com/office/drawing/2010/main" val="0"/>
+              </a:ext>
+            </a:extLst>
+          </a:blip>
+          <a:srcRect l="1072" r="11482"/>
+          <a:stretch/>
+        </p:blipFill>
+        <p:spPr bwMode="auto">
+          <a:xfrm>
+            <a:off x="7558675" y="3429000"/>
+            <a:ext cx="3408245" cy="2376182"/>
+          </a:xfrm>
+          <a:prstGeom prst="rect">
+            <a:avLst/>
+          </a:prstGeom>
+          <a:noFill/>
+          <a:extLst>
+            <a:ext uri="{909E8E84-426E-40DD-AFC4-6F175D3DCCD1}">
+              <a14:hiddenFill xmlns:a14="http://schemas.microsoft.com/office/drawing/2010/main">
+                <a:solidFill>
+                  <a:srgbClr val="FFFFFF"/>
+                </a:solidFill>
+              </a14:hiddenFill>
+            </a:ext>
+          </a:extLst>
+        </p:spPr>
+      </p:pic>
+      <p:pic>
+        <p:nvPicPr>
+          <p:cNvPr id="2055" name="Picture 7">
+            <a:extLst>
+              <a:ext uri="{FF2B5EF4-FFF2-40B4-BE49-F238E27FC236}">
+                <a16:creationId xmlns:a16="http://schemas.microsoft.com/office/drawing/2014/main" id="{C5F24615-672D-4FE5-894D-5E96EEC2F525}"/>
+              </a:ext>
+            </a:extLst>
+          </p:cNvPr>
+          <p:cNvPicPr>
+            <a:picLocks noChangeAspect="1" noChangeArrowheads="1"/>
+          </p:cNvPicPr>
+          <p:nvPr/>
+        </p:nvPicPr>
+        <p:blipFill>
+          <a:blip r:embed="rId3">
+            <a:extLst>
+              <a:ext uri="{28A0092B-C50C-407E-A947-70E740481C1C}">
+                <a14:useLocalDpi xmlns:a14="http://schemas.microsoft.com/office/drawing/2010/main" val="0"/>
+              </a:ext>
+            </a:extLst>
+          </a:blip>
+          <a:srcRect/>
+          <a:stretch>
+            <a:fillRect/>
+          </a:stretch>
+        </p:blipFill>
+        <p:spPr bwMode="auto">
+          <a:xfrm>
+            <a:off x="7198454" y="504826"/>
+            <a:ext cx="3038475" cy="2800350"/>
+          </a:xfrm>
+          <a:prstGeom prst="rect">
+            <a:avLst/>
+          </a:prstGeom>
+          <a:noFill/>
+          <a:extLst>
+            <a:ext uri="{909E8E84-426E-40DD-AFC4-6F175D3DCCD1}">
+              <a14:hiddenFill xmlns:a14="http://schemas.microsoft.com/office/drawing/2010/main">
+                <a:solidFill>
+                  <a:srgbClr val="FFFFFF"/>
+                </a:solidFill>
+              </a14:hiddenFill>
+            </a:ext>
+          </a:extLst>
+        </p:spPr>
+      </p:pic>
+      <p:pic>
+        <p:nvPicPr>
+          <p:cNvPr id="4" name="Picture 3">
+            <a:extLst>
+              <a:ext uri="{FF2B5EF4-FFF2-40B4-BE49-F238E27FC236}">
+                <a16:creationId xmlns:a16="http://schemas.microsoft.com/office/drawing/2014/main" id="{B539D720-7978-42B7-BC97-AEAF9A8B1BC8}"/>
+              </a:ext>
+            </a:extLst>
+          </p:cNvPr>
+          <p:cNvPicPr>
+            <a:picLocks noChangeAspect="1"/>
+          </p:cNvPicPr>
+          <p:nvPr/>
+        </p:nvPicPr>
+        <p:blipFill>
+          <a:blip r:embed="rId4"/>
+          <a:stretch>
+            <a:fillRect/>
+          </a:stretch>
+        </p:blipFill>
+        <p:spPr>
+          <a:xfrm>
+            <a:off x="2512154" y="5465166"/>
+            <a:ext cx="4686300" cy="371475"/>
+          </a:xfrm>
+          <a:prstGeom prst="rect">
+            <a:avLst/>
+          </a:prstGeom>
+        </p:spPr>
+      </p:pic>
+    </p:spTree>
+    <p:extLst>
+      <p:ext uri="{BB962C8B-B14F-4D97-AF65-F5344CB8AC3E}">
+        <p14:creationId xmlns:p14="http://schemas.microsoft.com/office/powerpoint/2010/main" val="3879182843"/>
       </p:ext>
     </p:extLst>
   </p:cSld>

</xml_diff>